<commit_message>
JDBC_URL added to config/constants.py
</commit_message>
<xml_diff>
--- a/docs/Kenneth Copas - Capstone Presentation.pptx
+++ b/docs/Kenneth Copas - Capstone Presentation.pptx
@@ -5,7 +5,7 @@
     <p:sldMasterId id="2147483648" r:id="rId1"/>
   </p:sldMasterIdLst>
   <p:notesMasterIdLst>
-    <p:notesMasterId r:id="rId19"/>
+    <p:notesMasterId r:id="rId18"/>
   </p:notesMasterIdLst>
   <p:sldIdLst>
     <p:sldId id="256" r:id="rId2"/>
@@ -22,9 +22,8 @@
     <p:sldId id="288" r:id="rId13"/>
     <p:sldId id="279" r:id="rId14"/>
     <p:sldId id="260" r:id="rId15"/>
-    <p:sldId id="282" r:id="rId16"/>
-    <p:sldId id="267" r:id="rId17"/>
-    <p:sldId id="283" r:id="rId18"/>
+    <p:sldId id="283" r:id="rId16"/>
+    <p:sldId id="293" r:id="rId17"/>
   </p:sldIdLst>
   <p:sldSz cx="12192000" cy="6858000"/>
   <p:notesSz cx="6858000" cy="9144000"/>
@@ -142,9 +141,8 @@
             <p14:sldId id="288"/>
             <p14:sldId id="279"/>
             <p14:sldId id="260"/>
-            <p14:sldId id="282"/>
-            <p14:sldId id="267"/>
             <p14:sldId id="283"/>
+            <p14:sldId id="293"/>
           </p14:sldIdLst>
         </p14:section>
       </p14:sectionLst>
@@ -15441,7 +15439,7 @@
           <a:p>
             <a:fld id="{7D709B56-B64F-48D4-986A-D7BA322A6C27}" type="datetimeFigureOut">
               <a:rPr lang="en-US" smtClean="0"/>
-              <a:t>6/2/2025</a:t>
+              <a:t>6/3/2025</a:t>
             </a:fld>
             <a:endParaRPr lang="en-US"/>
           </a:p>
@@ -16200,6 +16198,114 @@
 </p:notes>
 </file>
 
+<file path=ppt/notesSlides/notesSlide6.xml><?xml version="1.0" encoding="utf-8"?>
+<p:notes xmlns:a="http://schemas.openxmlformats.org/drawingml/2006/main" xmlns:r="http://schemas.openxmlformats.org/officeDocument/2006/relationships" xmlns:p="http://schemas.openxmlformats.org/presentationml/2006/main">
+  <p:cSld>
+    <p:spTree>
+      <p:nvGrpSpPr>
+        <p:cNvPr id="1" name="">
+          <a:extLst>
+            <a:ext uri="{FF2B5EF4-FFF2-40B4-BE49-F238E27FC236}">
+              <a16:creationId xmlns:a16="http://schemas.microsoft.com/office/drawing/2014/main" id="{C4432630-251B-9C9B-7155-166F795E62DF}"/>
+            </a:ext>
+          </a:extLst>
+        </p:cNvPr>
+        <p:cNvGrpSpPr/>
+        <p:nvPr/>
+      </p:nvGrpSpPr>
+      <p:grpSpPr>
+        <a:xfrm>
+          <a:off x="0" y="0"/>
+          <a:ext cx="0" cy="0"/>
+          <a:chOff x="0" y="0"/>
+          <a:chExt cx="0" cy="0"/>
+        </a:xfrm>
+      </p:grpSpPr>
+      <p:sp>
+        <p:nvSpPr>
+          <p:cNvPr id="2" name="Slide Image Placeholder 1">
+            <a:extLst>
+              <a:ext uri="{FF2B5EF4-FFF2-40B4-BE49-F238E27FC236}">
+                <a16:creationId xmlns:a16="http://schemas.microsoft.com/office/drawing/2014/main" id="{A609F5F0-08A8-1491-C54E-B9F1CB5D2401}"/>
+              </a:ext>
+            </a:extLst>
+          </p:cNvPr>
+          <p:cNvSpPr>
+            <a:spLocks noGrp="1" noRot="1" noChangeAspect="1"/>
+          </p:cNvSpPr>
+          <p:nvPr>
+            <p:ph type="sldImg"/>
+          </p:nvPr>
+        </p:nvSpPr>
+        <p:spPr/>
+      </p:sp>
+      <p:sp>
+        <p:nvSpPr>
+          <p:cNvPr id="3" name="Notes Placeholder 2">
+            <a:extLst>
+              <a:ext uri="{FF2B5EF4-FFF2-40B4-BE49-F238E27FC236}">
+                <a16:creationId xmlns:a16="http://schemas.microsoft.com/office/drawing/2014/main" id="{F521A3BA-E845-C99A-6B06-160CE8A5D3B2}"/>
+              </a:ext>
+            </a:extLst>
+          </p:cNvPr>
+          <p:cNvSpPr>
+            <a:spLocks noGrp="1"/>
+          </p:cNvSpPr>
+          <p:nvPr>
+            <p:ph type="body" idx="1"/>
+          </p:nvPr>
+        </p:nvSpPr>
+        <p:spPr/>
+        <p:txBody>
+          <a:bodyPr/>
+          <a:lstStyle/>
+          <a:p>
+            <a:endParaRPr lang="en-US" dirty="0"/>
+          </a:p>
+        </p:txBody>
+      </p:sp>
+      <p:sp>
+        <p:nvSpPr>
+          <p:cNvPr id="4" name="Slide Number Placeholder 3">
+            <a:extLst>
+              <a:ext uri="{FF2B5EF4-FFF2-40B4-BE49-F238E27FC236}">
+                <a16:creationId xmlns:a16="http://schemas.microsoft.com/office/drawing/2014/main" id="{0D871C80-4D6A-65DF-93B4-FC52519EC5C1}"/>
+              </a:ext>
+            </a:extLst>
+          </p:cNvPr>
+          <p:cNvSpPr>
+            <a:spLocks noGrp="1"/>
+          </p:cNvSpPr>
+          <p:nvPr>
+            <p:ph type="sldNum" sz="quarter" idx="5"/>
+          </p:nvPr>
+        </p:nvSpPr>
+        <p:spPr/>
+        <p:txBody>
+          <a:bodyPr/>
+          <a:lstStyle/>
+          <a:p>
+            <a:fld id="{4B18A450-44F2-44CF-978D-128E91F9EBE0}" type="slidenum">
+              <a:rPr lang="en-US" smtClean="0"/>
+              <a:t>16</a:t>
+            </a:fld>
+            <a:endParaRPr lang="en-US"/>
+          </a:p>
+        </p:txBody>
+      </p:sp>
+    </p:spTree>
+    <p:extLst>
+      <p:ext uri="{BB962C8B-B14F-4D97-AF65-F5344CB8AC3E}">
+        <p14:creationId xmlns:p14="http://schemas.microsoft.com/office/powerpoint/2010/main" val="2685506286"/>
+      </p:ext>
+    </p:extLst>
+  </p:cSld>
+  <p:clrMapOvr>
+    <a:masterClrMapping/>
+  </p:clrMapOvr>
+</p:notes>
+</file>
+
 <file path=ppt/slideLayouts/slideLayout1.xml><?xml version="1.0" encoding="utf-8"?>
 <p:sldLayout xmlns:a="http://schemas.openxmlformats.org/drawingml/2006/main" xmlns:r="http://schemas.openxmlformats.org/officeDocument/2006/relationships" xmlns:p="http://schemas.openxmlformats.org/presentationml/2006/main" type="title" preserve="1">
   <p:cSld name="Title Slide">
@@ -16347,7 +16453,7 @@
           <a:p>
             <a:fld id="{710A5CFE-F8A2-4EED-B2B2-AE5BD6E7F4BA}" type="datetimeFigureOut">
               <a:rPr lang="en-US" smtClean="0"/>
-              <a:t>6/2/2025</a:t>
+              <a:t>6/3/2025</a:t>
             </a:fld>
             <a:endParaRPr lang="en-US"/>
           </a:p>
@@ -16545,7 +16651,7 @@
           <a:p>
             <a:fld id="{710A5CFE-F8A2-4EED-B2B2-AE5BD6E7F4BA}" type="datetimeFigureOut">
               <a:rPr lang="en-US" smtClean="0"/>
-              <a:t>6/2/2025</a:t>
+              <a:t>6/3/2025</a:t>
             </a:fld>
             <a:endParaRPr lang="en-US"/>
           </a:p>
@@ -16753,7 +16859,7 @@
           <a:p>
             <a:fld id="{710A5CFE-F8A2-4EED-B2B2-AE5BD6E7F4BA}" type="datetimeFigureOut">
               <a:rPr lang="en-US" smtClean="0"/>
-              <a:t>6/2/2025</a:t>
+              <a:t>6/3/2025</a:t>
             </a:fld>
             <a:endParaRPr lang="en-US"/>
           </a:p>
@@ -16951,7 +17057,7 @@
           <a:p>
             <a:fld id="{710A5CFE-F8A2-4EED-B2B2-AE5BD6E7F4BA}" type="datetimeFigureOut">
               <a:rPr lang="en-US" smtClean="0"/>
-              <a:t>6/2/2025</a:t>
+              <a:t>6/3/2025</a:t>
             </a:fld>
             <a:endParaRPr lang="en-US"/>
           </a:p>
@@ -17226,7 +17332,7 @@
           <a:p>
             <a:fld id="{710A5CFE-F8A2-4EED-B2B2-AE5BD6E7F4BA}" type="datetimeFigureOut">
               <a:rPr lang="en-US" smtClean="0"/>
-              <a:t>6/2/2025</a:t>
+              <a:t>6/3/2025</a:t>
             </a:fld>
             <a:endParaRPr lang="en-US"/>
           </a:p>
@@ -17491,7 +17597,7 @@
           <a:p>
             <a:fld id="{710A5CFE-F8A2-4EED-B2B2-AE5BD6E7F4BA}" type="datetimeFigureOut">
               <a:rPr lang="en-US" smtClean="0"/>
-              <a:t>6/2/2025</a:t>
+              <a:t>6/3/2025</a:t>
             </a:fld>
             <a:endParaRPr lang="en-US"/>
           </a:p>
@@ -17903,7 +18009,7 @@
           <a:p>
             <a:fld id="{710A5CFE-F8A2-4EED-B2B2-AE5BD6E7F4BA}" type="datetimeFigureOut">
               <a:rPr lang="en-US" smtClean="0"/>
-              <a:t>6/2/2025</a:t>
+              <a:t>6/3/2025</a:t>
             </a:fld>
             <a:endParaRPr lang="en-US"/>
           </a:p>
@@ -18044,7 +18150,7 @@
           <a:p>
             <a:fld id="{710A5CFE-F8A2-4EED-B2B2-AE5BD6E7F4BA}" type="datetimeFigureOut">
               <a:rPr lang="en-US" smtClean="0"/>
-              <a:t>6/2/2025</a:t>
+              <a:t>6/3/2025</a:t>
             </a:fld>
             <a:endParaRPr lang="en-US"/>
           </a:p>
@@ -18157,7 +18263,7 @@
           <a:p>
             <a:fld id="{710A5CFE-F8A2-4EED-B2B2-AE5BD6E7F4BA}" type="datetimeFigureOut">
               <a:rPr lang="en-US" smtClean="0"/>
-              <a:t>6/2/2025</a:t>
+              <a:t>6/3/2025</a:t>
             </a:fld>
             <a:endParaRPr lang="en-US"/>
           </a:p>
@@ -18468,7 +18574,7 @@
           <a:p>
             <a:fld id="{710A5CFE-F8A2-4EED-B2B2-AE5BD6E7F4BA}" type="datetimeFigureOut">
               <a:rPr lang="en-US" smtClean="0"/>
-              <a:t>6/2/2025</a:t>
+              <a:t>6/3/2025</a:t>
             </a:fld>
             <a:endParaRPr lang="en-US"/>
           </a:p>
@@ -18756,7 +18862,7 @@
           <a:p>
             <a:fld id="{710A5CFE-F8A2-4EED-B2B2-AE5BD6E7F4BA}" type="datetimeFigureOut">
               <a:rPr lang="en-US" smtClean="0"/>
-              <a:t>6/2/2025</a:t>
+              <a:t>6/3/2025</a:t>
             </a:fld>
             <a:endParaRPr lang="en-US"/>
           </a:p>
@@ -18997,7 +19103,7 @@
           <a:p>
             <a:fld id="{710A5CFE-F8A2-4EED-B2B2-AE5BD6E7F4BA}" type="datetimeFigureOut">
               <a:rPr lang="en-US" smtClean="0"/>
-              <a:t>6/2/2025</a:t>
+              <a:t>6/3/2025</a:t>
             </a:fld>
             <a:endParaRPr lang="en-US"/>
           </a:p>
@@ -28087,1125 +28193,6 @@
         <p:cNvPr id="1" name="">
           <a:extLst>
             <a:ext uri="{FF2B5EF4-FFF2-40B4-BE49-F238E27FC236}">
-              <a16:creationId xmlns:a16="http://schemas.microsoft.com/office/drawing/2014/main" id="{00A1D46E-1417-A0B4-C2DD-C423B03F446D}"/>
-            </a:ext>
-          </a:extLst>
-        </p:cNvPr>
-        <p:cNvGrpSpPr/>
-        <p:nvPr/>
-      </p:nvGrpSpPr>
-      <p:grpSpPr>
-        <a:xfrm>
-          <a:off x="0" y="0"/>
-          <a:ext cx="0" cy="0"/>
-          <a:chOff x="0" y="0"/>
-          <a:chExt cx="0" cy="0"/>
-        </a:xfrm>
-      </p:grpSpPr>
-      <p:sp useBgFill="1">
-        <p:nvSpPr>
-          <p:cNvPr id="62" name="Rectangle 61">
-            <a:extLst>
-              <a:ext uri="{FF2B5EF4-FFF2-40B4-BE49-F238E27FC236}">
-                <a16:creationId xmlns:a16="http://schemas.microsoft.com/office/drawing/2014/main" id="{FB028B4B-EF20-F3AD-462F-7E97A7A0678E}"/>
-              </a:ext>
-              <a:ext uri="{C183D7F6-B498-43B3-948B-1728B52AA6E4}">
-                <adec:decorative xmlns:adec="http://schemas.microsoft.com/office/drawing/2017/decorative" val="1"/>
-              </a:ext>
-            </a:extLst>
-          </p:cNvPr>
-          <p:cNvSpPr>
-            <a:spLocks noGrp="1" noRot="1" noChangeAspect="1" noMove="1" noResize="1" noEditPoints="1" noAdjustHandles="1" noChangeArrowheads="1" noChangeShapeType="1" noTextEdit="1"/>
-          </p:cNvSpPr>
-          <p:nvPr>
-            <p:extLst>
-              <p:ext uri="{386F3935-93C4-4BCD-93E2-E3B085C9AB24}">
-                <p16:designElem xmlns:p16="http://schemas.microsoft.com/office/powerpoint/2015/main" val="1"/>
-              </p:ext>
-            </p:extLst>
-          </p:nvPr>
-        </p:nvSpPr>
-        <p:spPr>
-          <a:xfrm>
-            <a:off x="0" y="0"/>
-            <a:ext cx="12192000" cy="6858000"/>
-          </a:xfrm>
-          <a:prstGeom prst="rect">
-            <a:avLst/>
-          </a:prstGeom>
-          <a:ln w="12700" cap="flat" cmpd="sng" algn="ctr">
-            <a:noFill/>
-            <a:prstDash val="solid"/>
-            <a:miter lim="800000"/>
-          </a:ln>
-          <a:effectLst/>
-          <a:extLst>
-            <a:ext uri="{91240B29-F687-4F45-9708-019B960494DF}">
-              <a14:hiddenLine xmlns:a14="http://schemas.microsoft.com/office/drawing/2010/main" w="12700" cap="flat" cmpd="sng" algn="ctr">
-                <a:solidFill>
-                  <a:schemeClr val="accent1">
-                    <a:shade val="50000"/>
-                  </a:schemeClr>
-                </a:solidFill>
-                <a:prstDash val="solid"/>
-                <a:miter lim="800000"/>
-              </a14:hiddenLine>
-            </a:ext>
-          </a:extLst>
-        </p:spPr>
-        <p:style>
-          <a:lnRef idx="2">
-            <a:schemeClr val="accent1">
-              <a:shade val="50000"/>
-            </a:schemeClr>
-          </a:lnRef>
-          <a:fillRef idx="1">
-            <a:schemeClr val="accent1"/>
-          </a:fillRef>
-          <a:effectRef idx="0">
-            <a:schemeClr val="accent1"/>
-          </a:effectRef>
-          <a:fontRef idx="minor">
-            <a:schemeClr val="lt1"/>
-          </a:fontRef>
-        </p:style>
-        <p:txBody>
-          <a:bodyPr rtlCol="0" anchor="ctr"/>
-          <a:lstStyle/>
-          <a:p>
-            <a:pPr algn="ctr"/>
-            <a:endParaRPr lang="en-US"/>
-          </a:p>
-        </p:txBody>
-      </p:sp>
-      <p:sp>
-        <p:nvSpPr>
-          <p:cNvPr id="63" name="Rectangle 62">
-            <a:extLst>
-              <a:ext uri="{FF2B5EF4-FFF2-40B4-BE49-F238E27FC236}">
-                <a16:creationId xmlns:a16="http://schemas.microsoft.com/office/drawing/2014/main" id="{027C87D5-C9EE-AFA4-FACA-179A899DDB0D}"/>
-              </a:ext>
-              <a:ext uri="{C183D7F6-B498-43B3-948B-1728B52AA6E4}">
-                <adec:decorative xmlns:adec="http://schemas.microsoft.com/office/drawing/2017/decorative" val="1"/>
-              </a:ext>
-            </a:extLst>
-          </p:cNvPr>
-          <p:cNvSpPr>
-            <a:spLocks noGrp="1" noRot="1" noChangeAspect="1" noMove="1" noResize="1" noEditPoints="1" noAdjustHandles="1" noChangeArrowheads="1" noChangeShapeType="1" noTextEdit="1"/>
-          </p:cNvSpPr>
-          <p:nvPr>
-            <p:extLst>
-              <p:ext uri="{386F3935-93C4-4BCD-93E2-E3B085C9AB24}">
-                <p16:designElem xmlns:p16="http://schemas.microsoft.com/office/powerpoint/2015/main" val="1"/>
-              </p:ext>
-            </p:extLst>
-          </p:nvPr>
-        </p:nvSpPr>
-        <p:spPr>
-          <a:xfrm flipH="1">
-            <a:off x="2" y="0"/>
-            <a:ext cx="12191998" cy="1575955"/>
-          </a:xfrm>
-          <a:prstGeom prst="rect">
-            <a:avLst/>
-          </a:prstGeom>
-          <a:gradFill>
-            <a:gsLst>
-              <a:gs pos="0">
-                <a:srgbClr val="000000">
-                  <a:alpha val="96000"/>
-                </a:srgbClr>
-              </a:gs>
-              <a:gs pos="100000">
-                <a:schemeClr val="accent1">
-                  <a:lumMod val="75000"/>
-                </a:schemeClr>
-              </a:gs>
-            </a:gsLst>
-            <a:lin ang="8400000" scaled="0"/>
-          </a:gradFill>
-          <a:ln>
-            <a:noFill/>
-          </a:ln>
-        </p:spPr>
-        <p:style>
-          <a:lnRef idx="2">
-            <a:schemeClr val="accent1">
-              <a:shade val="50000"/>
-            </a:schemeClr>
-          </a:lnRef>
-          <a:fillRef idx="1">
-            <a:schemeClr val="accent1"/>
-          </a:fillRef>
-          <a:effectRef idx="0">
-            <a:schemeClr val="accent1"/>
-          </a:effectRef>
-          <a:fontRef idx="minor">
-            <a:schemeClr val="lt1"/>
-          </a:fontRef>
-        </p:style>
-        <p:txBody>
-          <a:bodyPr rtlCol="0" anchor="ctr"/>
-          <a:lstStyle/>
-          <a:p>
-            <a:pPr algn="ctr"/>
-            <a:endParaRPr lang="en-US"/>
-          </a:p>
-        </p:txBody>
-      </p:sp>
-      <p:sp>
-        <p:nvSpPr>
-          <p:cNvPr id="64" name="Rectangle 63">
-            <a:extLst>
-              <a:ext uri="{FF2B5EF4-FFF2-40B4-BE49-F238E27FC236}">
-                <a16:creationId xmlns:a16="http://schemas.microsoft.com/office/drawing/2014/main" id="{5616B5AF-DA75-6380-7636-07E61A5AC012}"/>
-              </a:ext>
-              <a:ext uri="{C183D7F6-B498-43B3-948B-1728B52AA6E4}">
-                <adec:decorative xmlns:adec="http://schemas.microsoft.com/office/drawing/2017/decorative" val="1"/>
-              </a:ext>
-            </a:extLst>
-          </p:cNvPr>
-          <p:cNvSpPr>
-            <a:spLocks noGrp="1" noRot="1" noChangeAspect="1" noMove="1" noResize="1" noEditPoints="1" noAdjustHandles="1" noChangeArrowheads="1" noChangeShapeType="1" noTextEdit="1"/>
-          </p:cNvSpPr>
-          <p:nvPr>
-            <p:extLst>
-              <p:ext uri="{386F3935-93C4-4BCD-93E2-E3B085C9AB24}">
-                <p16:designElem xmlns:p16="http://schemas.microsoft.com/office/powerpoint/2015/main" val="1"/>
-              </p:ext>
-            </p:extLst>
-          </p:nvPr>
-        </p:nvSpPr>
-        <p:spPr>
-          <a:xfrm rot="10800000" flipH="1">
-            <a:off x="8128857" y="0"/>
-            <a:ext cx="4063143" cy="1576412"/>
-          </a:xfrm>
-          <a:prstGeom prst="rect">
-            <a:avLst/>
-          </a:prstGeom>
-          <a:gradFill>
-            <a:gsLst>
-              <a:gs pos="19000">
-                <a:schemeClr val="accent1">
-                  <a:lumMod val="50000"/>
-                  <a:alpha val="68000"/>
-                </a:schemeClr>
-              </a:gs>
-              <a:gs pos="100000">
-                <a:schemeClr val="accent1">
-                  <a:alpha val="79000"/>
-                </a:schemeClr>
-              </a:gs>
-            </a:gsLst>
-            <a:lin ang="19200000" scaled="0"/>
-          </a:gradFill>
-          <a:ln>
-            <a:noFill/>
-          </a:ln>
-        </p:spPr>
-        <p:style>
-          <a:lnRef idx="2">
-            <a:schemeClr val="accent1">
-              <a:shade val="50000"/>
-            </a:schemeClr>
-          </a:lnRef>
-          <a:fillRef idx="1">
-            <a:schemeClr val="accent1"/>
-          </a:fillRef>
-          <a:effectRef idx="0">
-            <a:schemeClr val="accent1"/>
-          </a:effectRef>
-          <a:fontRef idx="minor">
-            <a:schemeClr val="lt1"/>
-          </a:fontRef>
-        </p:style>
-        <p:txBody>
-          <a:bodyPr rtlCol="0" anchor="ctr"/>
-          <a:lstStyle/>
-          <a:p>
-            <a:pPr algn="ctr"/>
-            <a:endParaRPr lang="en-US"/>
-          </a:p>
-        </p:txBody>
-      </p:sp>
-      <p:sp>
-        <p:nvSpPr>
-          <p:cNvPr id="65" name="Rectangle 64">
-            <a:extLst>
-              <a:ext uri="{FF2B5EF4-FFF2-40B4-BE49-F238E27FC236}">
-                <a16:creationId xmlns:a16="http://schemas.microsoft.com/office/drawing/2014/main" id="{417E9366-B0B3-8614-FD95-DC0BA7B73B59}"/>
-              </a:ext>
-              <a:ext uri="{C183D7F6-B498-43B3-948B-1728B52AA6E4}">
-                <adec:decorative xmlns:adec="http://schemas.microsoft.com/office/drawing/2017/decorative" val="1"/>
-              </a:ext>
-            </a:extLst>
-          </p:cNvPr>
-          <p:cNvSpPr>
-            <a:spLocks noGrp="1" noRot="1" noChangeAspect="1" noMove="1" noResize="1" noEditPoints="1" noAdjustHandles="1" noChangeArrowheads="1" noChangeShapeType="1" noTextEdit="1"/>
-          </p:cNvSpPr>
-          <p:nvPr>
-            <p:extLst>
-              <p:ext uri="{386F3935-93C4-4BCD-93E2-E3B085C9AB24}">
-                <p16:designElem xmlns:p16="http://schemas.microsoft.com/office/powerpoint/2015/main" val="1"/>
-              </p:ext>
-            </p:extLst>
-          </p:nvPr>
-        </p:nvSpPr>
-        <p:spPr>
-          <a:xfrm rot="5400000">
-            <a:off x="5307777" y="-5307778"/>
-            <a:ext cx="1576446" cy="12192002"/>
-          </a:xfrm>
-          <a:prstGeom prst="rect">
-            <a:avLst/>
-          </a:prstGeom>
-          <a:gradFill>
-            <a:gsLst>
-              <a:gs pos="23000">
-                <a:schemeClr val="accent1">
-                  <a:alpha val="0"/>
-                </a:schemeClr>
-              </a:gs>
-              <a:gs pos="99000">
-                <a:srgbClr val="000000">
-                  <a:alpha val="74000"/>
-                </a:srgbClr>
-              </a:gs>
-            </a:gsLst>
-            <a:lin ang="20400000" scaled="0"/>
-          </a:gradFill>
-          <a:ln>
-            <a:noFill/>
-          </a:ln>
-        </p:spPr>
-        <p:style>
-          <a:lnRef idx="2">
-            <a:schemeClr val="accent1">
-              <a:shade val="50000"/>
-            </a:schemeClr>
-          </a:lnRef>
-          <a:fillRef idx="1">
-            <a:schemeClr val="accent1"/>
-          </a:fillRef>
-          <a:effectRef idx="0">
-            <a:schemeClr val="accent1"/>
-          </a:effectRef>
-          <a:fontRef idx="minor">
-            <a:schemeClr val="lt1"/>
-          </a:fontRef>
-        </p:style>
-        <p:txBody>
-          <a:bodyPr rtlCol="0" anchor="ctr"/>
-          <a:lstStyle/>
-          <a:p>
-            <a:pPr algn="ctr"/>
-            <a:endParaRPr lang="en-US" dirty="0"/>
-          </a:p>
-        </p:txBody>
-      </p:sp>
-      <p:sp>
-        <p:nvSpPr>
-          <p:cNvPr id="2" name="Title 1">
-            <a:extLst>
-              <a:ext uri="{FF2B5EF4-FFF2-40B4-BE49-F238E27FC236}">
-                <a16:creationId xmlns:a16="http://schemas.microsoft.com/office/drawing/2014/main" id="{CA73079B-625C-7E78-6901-4FDDE4AEFF10}"/>
-              </a:ext>
-            </a:extLst>
-          </p:cNvPr>
-          <p:cNvSpPr>
-            <a:spLocks noGrp="1"/>
-          </p:cNvSpPr>
-          <p:nvPr>
-            <p:ph type="title"/>
-          </p:nvPr>
-        </p:nvSpPr>
-        <p:spPr>
-          <a:xfrm>
-            <a:off x="1073988" y="385205"/>
-            <a:ext cx="10044023" cy="877729"/>
-          </a:xfrm>
-        </p:spPr>
-        <p:txBody>
-          <a:bodyPr anchor="ctr">
-            <a:normAutofit/>
-          </a:bodyPr>
-          <a:lstStyle/>
-          <a:p>
-            <a:pPr algn="ctr"/>
-            <a:r>
-              <a:rPr lang="en-US" sz="4000" dirty="0">
-                <a:solidFill>
-                  <a:srgbClr val="FFFFFF"/>
-                </a:solidFill>
-              </a:rPr>
-              <a:t>Tableau Visualization</a:t>
-            </a:r>
-          </a:p>
-        </p:txBody>
-      </p:sp>
-      <mc:AlternateContent xmlns:mc="http://schemas.openxmlformats.org/markup-compatibility/2006" xmlns:we="http://schemas.microsoft.com/office/webextensions/webextension/2010/11" xmlns:pca="http://schemas.microsoft.com/office/powerpoint/2013/contentapp">
-        <mc:Choice Requires="we pca">
-          <p:graphicFrame>
-            <p:nvGraphicFramePr>
-              <p:cNvPr id="4" name="Content Placeholder 3">
-                <a:extLst>
-                  <a:ext uri="{FF2B5EF4-FFF2-40B4-BE49-F238E27FC236}">
-                    <a16:creationId xmlns:a16="http://schemas.microsoft.com/office/drawing/2014/main" id="{A3AE5D51-3C2F-A548-7A93-831C25F34FF1}"/>
-                  </a:ext>
-                </a:extLst>
-              </p:cNvPr>
-              <p:cNvGraphicFramePr>
-                <a:graphicFrameLocks noGrp="1"/>
-              </p:cNvGraphicFramePr>
-              <p:nvPr>
-                <p:ph idx="1"/>
-                <p:extLst>
-                  <p:ext uri="{D42A27DB-BD31-4B8C-83A1-F6EECF244321}">
-                    <p14:modId xmlns:p14="http://schemas.microsoft.com/office/powerpoint/2010/main" val="121921446"/>
-                  </p:ext>
-                </p:extLst>
-              </p:nvPr>
-            </p:nvGraphicFramePr>
-            <p:xfrm>
-              <a:off x="1073988" y="1575710"/>
-              <a:ext cx="10044022" cy="5282045"/>
-            </p:xfrm>
-            <a:graphic>
-              <a:graphicData uri="http://schemas.microsoft.com/office/webextensions/webextension/2010/11">
-                <we:webextensionref xmlns:we="http://schemas.microsoft.com/office/webextensions/webextension/2010/11" xmlns:r="http://schemas.openxmlformats.org/officeDocument/2006/relationships" r:id="rId2"/>
-              </a:graphicData>
-            </a:graphic>
-          </p:graphicFrame>
-        </mc:Choice>
-        <mc:Fallback xmlns="">
-          <p:pic>
-            <p:nvPicPr>
-              <p:cNvPr id="4" name="Content Placeholder 3">
-                <a:extLst>
-                  <a:ext uri="{FF2B5EF4-FFF2-40B4-BE49-F238E27FC236}">
-                    <a16:creationId xmlns:a16="http://schemas.microsoft.com/office/drawing/2014/main" id="{A3AE5D51-3C2F-A548-7A93-831C25F34FF1}"/>
-                  </a:ext>
-                </a:extLst>
-              </p:cNvPr>
-              <p:cNvPicPr>
-                <a:picLocks noGrp="1" noRot="1" noChangeAspect="1" noMove="1" noResize="1" noEditPoints="1" noAdjustHandles="1" noChangeArrowheads="1" noChangeShapeType="1"/>
-              </p:cNvPicPr>
-              <p:nvPr/>
-            </p:nvPicPr>
-            <p:blipFill>
-              <a:blip r:embed="rId3"/>
-              <a:stretch>
-                <a:fillRect/>
-              </a:stretch>
-            </p:blipFill>
-            <p:spPr>
-              <a:xfrm>
-                <a:off x="1073988" y="1575710"/>
-                <a:ext cx="10044022" cy="5282045"/>
-              </a:xfrm>
-              <a:prstGeom prst="rect">
-                <a:avLst/>
-              </a:prstGeom>
-            </p:spPr>
-          </p:pic>
-        </mc:Fallback>
-      </mc:AlternateContent>
-    </p:spTree>
-    <p:extLst>
-      <p:ext uri="{BB962C8B-B14F-4D97-AF65-F5344CB8AC3E}">
-        <p14:creationId xmlns:p14="http://schemas.microsoft.com/office/powerpoint/2010/main" val="1850807906"/>
-      </p:ext>
-    </p:extLst>
-  </p:cSld>
-  <p:clrMapOvr>
-    <a:masterClrMapping/>
-  </p:clrMapOvr>
-</p:sld>
-</file>
-
-<file path=ppt/slides/slide16.xml><?xml version="1.0" encoding="utf-8"?>
-<p:sld xmlns:a="http://schemas.openxmlformats.org/drawingml/2006/main" xmlns:r="http://schemas.openxmlformats.org/officeDocument/2006/relationships" xmlns:p="http://schemas.openxmlformats.org/presentationml/2006/main">
-  <p:cSld>
-    <p:bg>
-      <p:bgPr>
-        <a:solidFill>
-          <a:schemeClr val="bg1"/>
-        </a:solidFill>
-        <a:effectLst/>
-      </p:bgPr>
-    </p:bg>
-    <p:spTree>
-      <p:nvGrpSpPr>
-        <p:cNvPr id="1" name=""/>
-        <p:cNvGrpSpPr/>
-        <p:nvPr/>
-      </p:nvGrpSpPr>
-      <p:grpSpPr>
-        <a:xfrm>
-          <a:off x="0" y="0"/>
-          <a:ext cx="0" cy="0"/>
-          <a:chOff x="0" y="0"/>
-          <a:chExt cx="0" cy="0"/>
-        </a:xfrm>
-      </p:grpSpPr>
-      <p:sp useBgFill="1">
-        <p:nvSpPr>
-          <p:cNvPr id="27" name="Rectangle 26">
-            <a:extLst>
-              <a:ext uri="{FF2B5EF4-FFF2-40B4-BE49-F238E27FC236}">
-                <a16:creationId xmlns:a16="http://schemas.microsoft.com/office/drawing/2014/main" id="{8C790BE2-4E4F-4AAF-81A2-4A6F4885EBE6}"/>
-              </a:ext>
-              <a:ext uri="{C183D7F6-B498-43B3-948B-1728B52AA6E4}">
-                <adec:decorative xmlns:adec="http://schemas.microsoft.com/office/drawing/2017/decorative" val="1"/>
-              </a:ext>
-            </a:extLst>
-          </p:cNvPr>
-          <p:cNvSpPr>
-            <a:spLocks noGrp="1" noRot="1" noChangeAspect="1" noMove="1" noResize="1" noEditPoints="1" noAdjustHandles="1" noChangeArrowheads="1" noChangeShapeType="1" noTextEdit="1"/>
-          </p:cNvSpPr>
-          <p:nvPr>
-            <p:extLst>
-              <p:ext uri="{386F3935-93C4-4BCD-93E2-E3B085C9AB24}">
-                <p16:designElem xmlns:p16="http://schemas.microsoft.com/office/powerpoint/2015/main" val="1"/>
-              </p:ext>
-            </p:extLst>
-          </p:nvPr>
-        </p:nvSpPr>
-        <p:spPr>
-          <a:xfrm>
-            <a:off x="0" y="0"/>
-            <a:ext cx="12192000" cy="6858000"/>
-          </a:xfrm>
-          <a:prstGeom prst="rect">
-            <a:avLst/>
-          </a:prstGeom>
-          <a:ln w="12700" cap="flat" cmpd="sng" algn="ctr">
-            <a:noFill/>
-            <a:prstDash val="solid"/>
-            <a:miter lim="800000"/>
-          </a:ln>
-          <a:effectLst/>
-          <a:extLst>
-            <a:ext uri="{91240B29-F687-4F45-9708-019B960494DF}">
-              <a14:hiddenLine xmlns:a14="http://schemas.microsoft.com/office/drawing/2010/main" w="12700" cap="flat" cmpd="sng" algn="ctr">
-                <a:solidFill>
-                  <a:schemeClr val="accent1">
-                    <a:shade val="50000"/>
-                  </a:schemeClr>
-                </a:solidFill>
-                <a:prstDash val="solid"/>
-                <a:miter lim="800000"/>
-              </a14:hiddenLine>
-            </a:ext>
-          </a:extLst>
-        </p:spPr>
-        <p:style>
-          <a:lnRef idx="2">
-            <a:schemeClr val="accent1">
-              <a:shade val="50000"/>
-            </a:schemeClr>
-          </a:lnRef>
-          <a:fillRef idx="1">
-            <a:schemeClr val="accent1"/>
-          </a:fillRef>
-          <a:effectRef idx="0">
-            <a:schemeClr val="accent1"/>
-          </a:effectRef>
-          <a:fontRef idx="minor">
-            <a:schemeClr val="lt1"/>
-          </a:fontRef>
-        </p:style>
-        <p:txBody>
-          <a:bodyPr rtlCol="0" anchor="ctr"/>
-          <a:lstStyle/>
-          <a:p>
-            <a:pPr algn="ctr"/>
-            <a:endParaRPr lang="en-US"/>
-          </a:p>
-        </p:txBody>
-      </p:sp>
-      <p:sp>
-        <p:nvSpPr>
-          <p:cNvPr id="29" name="Rectangle 28">
-            <a:extLst>
-              <a:ext uri="{FF2B5EF4-FFF2-40B4-BE49-F238E27FC236}">
-                <a16:creationId xmlns:a16="http://schemas.microsoft.com/office/drawing/2014/main" id="{D28B54C3-B57B-472A-B96E-1FCB67093DC2}"/>
-              </a:ext>
-              <a:ext uri="{C183D7F6-B498-43B3-948B-1728B52AA6E4}">
-                <adec:decorative xmlns:adec="http://schemas.microsoft.com/office/drawing/2017/decorative" val="1"/>
-              </a:ext>
-            </a:extLst>
-          </p:cNvPr>
-          <p:cNvSpPr>
-            <a:spLocks noGrp="1" noRot="1" noChangeAspect="1" noMove="1" noResize="1" noEditPoints="1" noAdjustHandles="1" noChangeArrowheads="1" noChangeShapeType="1" noTextEdit="1"/>
-          </p:cNvSpPr>
-          <p:nvPr>
-            <p:extLst>
-              <p:ext uri="{386F3935-93C4-4BCD-93E2-E3B085C9AB24}">
-                <p16:designElem xmlns:p16="http://schemas.microsoft.com/office/powerpoint/2015/main" val="1"/>
-              </p:ext>
-            </p:extLst>
-          </p:nvPr>
-        </p:nvSpPr>
-        <p:spPr>
-          <a:xfrm flipH="1">
-            <a:off x="-1" y="0"/>
-            <a:ext cx="12191999" cy="6858000"/>
-          </a:xfrm>
-          <a:prstGeom prst="rect">
-            <a:avLst/>
-          </a:prstGeom>
-          <a:gradFill>
-            <a:gsLst>
-              <a:gs pos="0">
-                <a:schemeClr val="accent1">
-                  <a:lumMod val="50000"/>
-                </a:schemeClr>
-              </a:gs>
-              <a:gs pos="100000">
-                <a:srgbClr val="000000"/>
-              </a:gs>
-            </a:gsLst>
-            <a:lin ang="13800000" scaled="0"/>
-          </a:gradFill>
-          <a:ln>
-            <a:noFill/>
-          </a:ln>
-        </p:spPr>
-        <p:style>
-          <a:lnRef idx="2">
-            <a:schemeClr val="accent1">
-              <a:shade val="50000"/>
-            </a:schemeClr>
-          </a:lnRef>
-          <a:fillRef idx="1">
-            <a:schemeClr val="accent1"/>
-          </a:fillRef>
-          <a:effectRef idx="0">
-            <a:schemeClr val="accent1"/>
-          </a:effectRef>
-          <a:fontRef idx="minor">
-            <a:schemeClr val="lt1"/>
-          </a:fontRef>
-        </p:style>
-        <p:txBody>
-          <a:bodyPr rtlCol="0" anchor="ctr"/>
-          <a:lstStyle/>
-          <a:p>
-            <a:pPr algn="ctr"/>
-            <a:endParaRPr lang="en-US"/>
-          </a:p>
-        </p:txBody>
-      </p:sp>
-      <p:sp>
-        <p:nvSpPr>
-          <p:cNvPr id="31" name="Rectangle 30">
-            <a:extLst>
-              <a:ext uri="{FF2B5EF4-FFF2-40B4-BE49-F238E27FC236}">
-                <a16:creationId xmlns:a16="http://schemas.microsoft.com/office/drawing/2014/main" id="{7DB3C429-F8DA-49B9-AF84-21996FCF78B5}"/>
-              </a:ext>
-              <a:ext uri="{C183D7F6-B498-43B3-948B-1728B52AA6E4}">
-                <adec:decorative xmlns:adec="http://schemas.microsoft.com/office/drawing/2017/decorative" val="1"/>
-              </a:ext>
-            </a:extLst>
-          </p:cNvPr>
-          <p:cNvSpPr>
-            <a:spLocks noGrp="1" noRot="1" noChangeAspect="1" noMove="1" noResize="1" noEditPoints="1" noAdjustHandles="1" noChangeArrowheads="1" noChangeShapeType="1" noTextEdit="1"/>
-          </p:cNvSpPr>
-          <p:nvPr>
-            <p:extLst>
-              <p:ext uri="{386F3935-93C4-4BCD-93E2-E3B085C9AB24}">
-                <p16:designElem xmlns:p16="http://schemas.microsoft.com/office/powerpoint/2015/main" val="1"/>
-              </p:ext>
-            </p:extLst>
-          </p:nvPr>
-        </p:nvSpPr>
-        <p:spPr>
-          <a:xfrm rot="10800000">
-            <a:off x="0" y="-4"/>
-            <a:ext cx="12192000" cy="6402581"/>
-          </a:xfrm>
-          <a:prstGeom prst="rect">
-            <a:avLst/>
-          </a:prstGeom>
-          <a:gradFill>
-            <a:gsLst>
-              <a:gs pos="1000">
-                <a:schemeClr val="accent1">
-                  <a:lumMod val="75000"/>
-                  <a:alpha val="59000"/>
-                </a:schemeClr>
-              </a:gs>
-              <a:gs pos="100000">
-                <a:srgbClr val="000000"/>
-              </a:gs>
-            </a:gsLst>
-            <a:lin ang="15000000" scaled="0"/>
-          </a:gradFill>
-          <a:ln>
-            <a:noFill/>
-          </a:ln>
-        </p:spPr>
-        <p:style>
-          <a:lnRef idx="2">
-            <a:schemeClr val="accent1">
-              <a:shade val="50000"/>
-            </a:schemeClr>
-          </a:lnRef>
-          <a:fillRef idx="1">
-            <a:schemeClr val="accent1"/>
-          </a:fillRef>
-          <a:effectRef idx="0">
-            <a:schemeClr val="accent1"/>
-          </a:effectRef>
-          <a:fontRef idx="minor">
-            <a:schemeClr val="lt1"/>
-          </a:fontRef>
-        </p:style>
-        <p:txBody>
-          <a:bodyPr rtlCol="0" anchor="ctr"/>
-          <a:lstStyle/>
-          <a:p>
-            <a:pPr algn="ctr"/>
-            <a:endParaRPr lang="en-US"/>
-          </a:p>
-        </p:txBody>
-      </p:sp>
-      <p:sp>
-        <p:nvSpPr>
-          <p:cNvPr id="33" name="Rectangle 32">
-            <a:extLst>
-              <a:ext uri="{FF2B5EF4-FFF2-40B4-BE49-F238E27FC236}">
-                <a16:creationId xmlns:a16="http://schemas.microsoft.com/office/drawing/2014/main" id="{E12088DD-B1AD-40E0-8B86-1D87A2CCD9BE}"/>
-              </a:ext>
-              <a:ext uri="{C183D7F6-B498-43B3-948B-1728B52AA6E4}">
-                <adec:decorative xmlns:adec="http://schemas.microsoft.com/office/drawing/2017/decorative" val="1"/>
-              </a:ext>
-            </a:extLst>
-          </p:cNvPr>
-          <p:cNvSpPr>
-            <a:spLocks noGrp="1" noRot="1" noChangeAspect="1" noMove="1" noResize="1" noEditPoints="1" noAdjustHandles="1" noChangeArrowheads="1" noChangeShapeType="1" noTextEdit="1"/>
-          </p:cNvSpPr>
-          <p:nvPr>
-            <p:extLst>
-              <p:ext uri="{386F3935-93C4-4BCD-93E2-E3B085C9AB24}">
-                <p16:designElem xmlns:p16="http://schemas.microsoft.com/office/powerpoint/2015/main" val="1"/>
-              </p:ext>
-            </p:extLst>
-          </p:nvPr>
-        </p:nvSpPr>
-        <p:spPr>
-          <a:xfrm rot="5400000" flipH="1">
-            <a:off x="2663054" y="-2653923"/>
-            <a:ext cx="6858001" cy="12165846"/>
-          </a:xfrm>
-          <a:prstGeom prst="rect">
-            <a:avLst/>
-          </a:prstGeom>
-          <a:gradFill>
-            <a:gsLst>
-              <a:gs pos="13000">
-                <a:schemeClr val="accent1">
-                  <a:lumMod val="50000"/>
-                  <a:alpha val="0"/>
-                </a:schemeClr>
-              </a:gs>
-              <a:gs pos="99000">
-                <a:srgbClr val="000000">
-                  <a:alpha val="28000"/>
-                </a:srgbClr>
-              </a:gs>
-            </a:gsLst>
-            <a:lin ang="0" scaled="0"/>
-          </a:gradFill>
-          <a:ln>
-            <a:noFill/>
-          </a:ln>
-        </p:spPr>
-        <p:style>
-          <a:lnRef idx="2">
-            <a:schemeClr val="accent1">
-              <a:shade val="50000"/>
-            </a:schemeClr>
-          </a:lnRef>
-          <a:fillRef idx="1">
-            <a:schemeClr val="accent1"/>
-          </a:fillRef>
-          <a:effectRef idx="0">
-            <a:schemeClr val="accent1"/>
-          </a:effectRef>
-          <a:fontRef idx="minor">
-            <a:schemeClr val="lt1"/>
-          </a:fontRef>
-        </p:style>
-        <p:txBody>
-          <a:bodyPr rtlCol="0" anchor="ctr"/>
-          <a:lstStyle/>
-          <a:p>
-            <a:pPr algn="ctr"/>
-            <a:endParaRPr lang="en-US" dirty="0"/>
-          </a:p>
-        </p:txBody>
-      </p:sp>
-      <p:sp>
-        <p:nvSpPr>
-          <p:cNvPr id="35" name="Rectangle 34">
-            <a:extLst>
-              <a:ext uri="{FF2B5EF4-FFF2-40B4-BE49-F238E27FC236}">
-                <a16:creationId xmlns:a16="http://schemas.microsoft.com/office/drawing/2014/main" id="{C4C9F2B0-1044-46EB-8AEB-C3BFFDE6C2CC}"/>
-              </a:ext>
-              <a:ext uri="{C183D7F6-B498-43B3-948B-1728B52AA6E4}">
-                <adec:decorative xmlns:adec="http://schemas.microsoft.com/office/drawing/2017/decorative" val="1"/>
-              </a:ext>
-            </a:extLst>
-          </p:cNvPr>
-          <p:cNvSpPr>
-            <a:spLocks noGrp="1" noRot="1" noChangeAspect="1" noMove="1" noResize="1" noEditPoints="1" noAdjustHandles="1" noChangeArrowheads="1" noChangeShapeType="1" noTextEdit="1"/>
-          </p:cNvSpPr>
-          <p:nvPr>
-            <p:extLst>
-              <p:ext uri="{386F3935-93C4-4BCD-93E2-E3B085C9AB24}">
-                <p16:designElem xmlns:p16="http://schemas.microsoft.com/office/powerpoint/2015/main" val="1"/>
-              </p:ext>
-            </p:extLst>
-          </p:nvPr>
-        </p:nvSpPr>
-        <p:spPr>
-          <a:xfrm flipH="1">
-            <a:off x="6094763" y="0"/>
-            <a:ext cx="6096001" cy="6858000"/>
-          </a:xfrm>
-          <a:prstGeom prst="rect">
-            <a:avLst/>
-          </a:prstGeom>
-          <a:gradFill>
-            <a:gsLst>
-              <a:gs pos="13000">
-                <a:schemeClr val="accent1">
-                  <a:lumMod val="50000"/>
-                  <a:alpha val="0"/>
-                </a:schemeClr>
-              </a:gs>
-              <a:gs pos="99000">
-                <a:schemeClr val="accent1">
-                  <a:lumMod val="75000"/>
-                  <a:alpha val="50000"/>
-                </a:schemeClr>
-              </a:gs>
-            </a:gsLst>
-            <a:lin ang="6000000" scaled="0"/>
-          </a:gradFill>
-          <a:ln>
-            <a:noFill/>
-          </a:ln>
-        </p:spPr>
-        <p:style>
-          <a:lnRef idx="2">
-            <a:schemeClr val="accent1">
-              <a:shade val="50000"/>
-            </a:schemeClr>
-          </a:lnRef>
-          <a:fillRef idx="1">
-            <a:schemeClr val="accent1"/>
-          </a:fillRef>
-          <a:effectRef idx="0">
-            <a:schemeClr val="accent1"/>
-          </a:effectRef>
-          <a:fontRef idx="minor">
-            <a:schemeClr val="lt1"/>
-          </a:fontRef>
-        </p:style>
-        <p:txBody>
-          <a:bodyPr rtlCol="0" anchor="ctr"/>
-          <a:lstStyle/>
-          <a:p>
-            <a:pPr algn="ctr"/>
-            <a:endParaRPr lang="en-US" dirty="0"/>
-          </a:p>
-        </p:txBody>
-      </p:sp>
-      <p:sp>
-        <p:nvSpPr>
-          <p:cNvPr id="37" name="Rectangle 36">
-            <a:extLst>
-              <a:ext uri="{FF2B5EF4-FFF2-40B4-BE49-F238E27FC236}">
-                <a16:creationId xmlns:a16="http://schemas.microsoft.com/office/drawing/2014/main" id="{0C395952-4E26-45A2-8756-2ADFD6E53C6E}"/>
-              </a:ext>
-              <a:ext uri="{C183D7F6-B498-43B3-948B-1728B52AA6E4}">
-                <adec:decorative xmlns:adec="http://schemas.microsoft.com/office/drawing/2017/decorative" val="1"/>
-              </a:ext>
-            </a:extLst>
-          </p:cNvPr>
-          <p:cNvSpPr>
-            <a:spLocks noGrp="1" noRot="1" noChangeAspect="1" noMove="1" noResize="1" noEditPoints="1" noAdjustHandles="1" noChangeArrowheads="1" noChangeShapeType="1" noTextEdit="1"/>
-          </p:cNvSpPr>
-          <p:nvPr>
-            <p:extLst>
-              <p:ext uri="{386F3935-93C4-4BCD-93E2-E3B085C9AB24}">
-                <p16:designElem xmlns:p16="http://schemas.microsoft.com/office/powerpoint/2015/main" val="1"/>
-              </p:ext>
-            </p:extLst>
-          </p:nvPr>
-        </p:nvSpPr>
-        <p:spPr>
-          <a:xfrm flipH="1">
-            <a:off x="-4" y="-3"/>
-            <a:ext cx="12182871" cy="6871922"/>
-          </a:xfrm>
-          <a:prstGeom prst="rect">
-            <a:avLst/>
-          </a:prstGeom>
-          <a:gradFill>
-            <a:gsLst>
-              <a:gs pos="13000">
-                <a:srgbClr val="000000">
-                  <a:alpha val="35000"/>
-                </a:srgbClr>
-              </a:gs>
-              <a:gs pos="99000">
-                <a:schemeClr val="accent1">
-                  <a:lumMod val="75000"/>
-                  <a:alpha val="0"/>
-                </a:schemeClr>
-              </a:gs>
-            </a:gsLst>
-            <a:lin ang="4800000" scaled="0"/>
-          </a:gradFill>
-          <a:ln>
-            <a:noFill/>
-          </a:ln>
-        </p:spPr>
-        <p:style>
-          <a:lnRef idx="2">
-            <a:schemeClr val="accent1">
-              <a:shade val="50000"/>
-            </a:schemeClr>
-          </a:lnRef>
-          <a:fillRef idx="1">
-            <a:schemeClr val="accent1"/>
-          </a:fillRef>
-          <a:effectRef idx="0">
-            <a:schemeClr val="accent1"/>
-          </a:effectRef>
-          <a:fontRef idx="minor">
-            <a:schemeClr val="lt1"/>
-          </a:fontRef>
-        </p:style>
-        <p:txBody>
-          <a:bodyPr rtlCol="0" anchor="ctr"/>
-          <a:lstStyle/>
-          <a:p>
-            <a:pPr algn="ctr"/>
-            <a:endParaRPr lang="en-US" dirty="0"/>
-          </a:p>
-        </p:txBody>
-      </p:sp>
-      <p:sp>
-        <p:nvSpPr>
-          <p:cNvPr id="39" name="Freeform: Shape 38">
-            <a:extLst>
-              <a:ext uri="{FF2B5EF4-FFF2-40B4-BE49-F238E27FC236}">
-                <a16:creationId xmlns:a16="http://schemas.microsoft.com/office/drawing/2014/main" id="{4734BADF-9461-4621-B112-2D7BABEA7DD0}"/>
-              </a:ext>
-              <a:ext uri="{C183D7F6-B498-43B3-948B-1728B52AA6E4}">
-                <adec:decorative xmlns:adec="http://schemas.microsoft.com/office/drawing/2017/decorative" val="1"/>
-              </a:ext>
-            </a:extLst>
-          </p:cNvPr>
-          <p:cNvSpPr>
-            <a:spLocks noGrp="1" noRot="1" noChangeAspect="1" noMove="1" noResize="1" noEditPoints="1" noAdjustHandles="1" noChangeArrowheads="1" noChangeShapeType="1" noTextEdit="1"/>
-          </p:cNvSpPr>
-          <p:nvPr>
-            <p:extLst>
-              <p:ext uri="{386F3935-93C4-4BCD-93E2-E3B085C9AB24}">
-                <p16:designElem xmlns:p16="http://schemas.microsoft.com/office/powerpoint/2015/main" val="1"/>
-              </p:ext>
-            </p:extLst>
-          </p:nvPr>
-        </p:nvSpPr>
-        <p:spPr>
-          <a:xfrm>
-            <a:off x="987713" y="4049"/>
-            <a:ext cx="10216576" cy="4729040"/>
-          </a:xfrm>
-          <a:custGeom>
-            <a:avLst/>
-            <a:gdLst>
-              <a:gd name="connsiteX0" fmla="*/ 0 w 10216576"/>
-              <a:gd name="connsiteY0" fmla="*/ 0 h 4729040"/>
-              <a:gd name="connsiteX1" fmla="*/ 10216576 w 10216576"/>
-              <a:gd name="connsiteY1" fmla="*/ 0 h 4729040"/>
-              <a:gd name="connsiteX2" fmla="*/ 10210268 w 10216576"/>
-              <a:gd name="connsiteY2" fmla="*/ 124944 h 4729040"/>
-              <a:gd name="connsiteX3" fmla="*/ 5108288 w 10216576"/>
-              <a:gd name="connsiteY3" fmla="*/ 4729040 h 4729040"/>
-              <a:gd name="connsiteX4" fmla="*/ 6309 w 10216576"/>
-              <a:gd name="connsiteY4" fmla="*/ 124944 h 4729040"/>
-            </a:gdLst>
-            <a:ahLst/>
-            <a:cxnLst>
-              <a:cxn ang="0">
-                <a:pos x="connsiteX0" y="connsiteY0"/>
-              </a:cxn>
-              <a:cxn ang="0">
-                <a:pos x="connsiteX1" y="connsiteY1"/>
-              </a:cxn>
-              <a:cxn ang="0">
-                <a:pos x="connsiteX2" y="connsiteY2"/>
-              </a:cxn>
-              <a:cxn ang="0">
-                <a:pos x="connsiteX3" y="connsiteY3"/>
-              </a:cxn>
-              <a:cxn ang="0">
-                <a:pos x="connsiteX4" y="connsiteY4"/>
-              </a:cxn>
-            </a:cxnLst>
-            <a:rect l="l" t="t" r="r" b="b"/>
-            <a:pathLst>
-              <a:path w="10216576" h="4729040">
-                <a:moveTo>
-                  <a:pt x="0" y="0"/>
-                </a:moveTo>
-                <a:lnTo>
-                  <a:pt x="10216576" y="0"/>
-                </a:lnTo>
-                <a:lnTo>
-                  <a:pt x="10210268" y="124944"/>
-                </a:lnTo>
-                <a:cubicBezTo>
-                  <a:pt x="9947637" y="2710997"/>
-                  <a:pt x="7763635" y="4729040"/>
-                  <a:pt x="5108288" y="4729040"/>
-                </a:cubicBezTo>
-                <a:cubicBezTo>
-                  <a:pt x="2452942" y="4729040"/>
-                  <a:pt x="268937" y="2710997"/>
-                  <a:pt x="6309" y="124944"/>
-                </a:cubicBezTo>
-                <a:close/>
-              </a:path>
-            </a:pathLst>
-          </a:custGeom>
-          <a:gradFill>
-            <a:gsLst>
-              <a:gs pos="7000">
-                <a:schemeClr val="accent1">
-                  <a:lumMod val="50000"/>
-                  <a:alpha val="4000"/>
-                </a:schemeClr>
-              </a:gs>
-              <a:gs pos="99000">
-                <a:schemeClr val="accent1">
-                  <a:alpha val="24000"/>
-                </a:schemeClr>
-              </a:gs>
-            </a:gsLst>
-            <a:lin ang="10200000" scaled="0"/>
-          </a:gradFill>
-          <a:ln>
-            <a:noFill/>
-          </a:ln>
-        </p:spPr>
-        <p:style>
-          <a:lnRef idx="2">
-            <a:schemeClr val="accent1">
-              <a:shade val="50000"/>
-            </a:schemeClr>
-          </a:lnRef>
-          <a:fillRef idx="1">
-            <a:schemeClr val="accent1"/>
-          </a:fillRef>
-          <a:effectRef idx="0">
-            <a:schemeClr val="accent1"/>
-          </a:effectRef>
-          <a:fontRef idx="minor">
-            <a:schemeClr val="lt1"/>
-          </a:fontRef>
-        </p:style>
-        <p:txBody>
-          <a:bodyPr wrap="square" rtlCol="0" anchor="ctr">
-            <a:noAutofit/>
-          </a:bodyPr>
-          <a:lstStyle/>
-          <a:p>
-            <a:pPr algn="ctr"/>
-            <a:endParaRPr lang="en-US"/>
-          </a:p>
-        </p:txBody>
-      </p:sp>
-      <p:sp>
-        <p:nvSpPr>
-          <p:cNvPr id="2" name="Title 1">
-            <a:extLst>
-              <a:ext uri="{FF2B5EF4-FFF2-40B4-BE49-F238E27FC236}">
-                <a16:creationId xmlns:a16="http://schemas.microsoft.com/office/drawing/2014/main" id="{466DB94C-97D3-0B5E-1933-8206C00C7A1E}"/>
-              </a:ext>
-            </a:extLst>
-          </p:cNvPr>
-          <p:cNvSpPr>
-            <a:spLocks noGrp="1"/>
-          </p:cNvSpPr>
-          <p:nvPr>
-            <p:ph type="title"/>
-          </p:nvPr>
-        </p:nvSpPr>
-        <p:spPr>
-          <a:xfrm>
-            <a:off x="2026693" y="1030406"/>
-            <a:ext cx="8147713" cy="3081242"/>
-          </a:xfrm>
-        </p:spPr>
-        <p:txBody>
-          <a:bodyPr vert="horz" lIns="91440" tIns="45720" rIns="91440" bIns="45720" rtlCol="0" anchor="ctr">
-            <a:normAutofit/>
-          </a:bodyPr>
-          <a:lstStyle/>
-          <a:p>
-            <a:pPr algn="ctr"/>
-            <a:r>
-              <a:rPr lang="en-US" sz="4800" kern="1200" dirty="0">
-                <a:solidFill>
-                  <a:srgbClr val="FFFFFF"/>
-                </a:solidFill>
-                <a:latin typeface="+mj-lt"/>
-                <a:ea typeface="+mj-ea"/>
-                <a:cs typeface="+mj-cs"/>
-              </a:rPr>
-              <a:t>Thanks!</a:t>
-            </a:r>
-          </a:p>
-        </p:txBody>
-      </p:sp>
-    </p:spTree>
-    <p:extLst>
-      <p:ext uri="{BB962C8B-B14F-4D97-AF65-F5344CB8AC3E}">
-        <p14:creationId xmlns:p14="http://schemas.microsoft.com/office/powerpoint/2010/main" val="962527845"/>
-      </p:ext>
-    </p:extLst>
-  </p:cSld>
-  <p:clrMapOvr>
-    <a:masterClrMapping/>
-  </p:clrMapOvr>
-</p:sld>
-</file>
-
-<file path=ppt/slides/slide17.xml><?xml version="1.0" encoding="utf-8"?>
-<p:sld xmlns:a="http://schemas.openxmlformats.org/drawingml/2006/main" xmlns:r="http://schemas.openxmlformats.org/officeDocument/2006/relationships" xmlns:p="http://schemas.openxmlformats.org/presentationml/2006/main">
-  <p:cSld>
-    <p:bg>
-      <p:bgPr>
-        <a:solidFill>
-          <a:schemeClr val="bg1"/>
-        </a:solidFill>
-        <a:effectLst/>
-      </p:bgPr>
-    </p:bg>
-    <p:spTree>
-      <p:nvGrpSpPr>
-        <p:cNvPr id="1" name="">
-          <a:extLst>
-            <a:ext uri="{FF2B5EF4-FFF2-40B4-BE49-F238E27FC236}">
               <a16:creationId xmlns:a16="http://schemas.microsoft.com/office/drawing/2014/main" id="{362D1B8D-4DEE-5E72-F909-72AAF8DC8E32}"/>
             </a:ext>
           </a:extLst>
@@ -29603,6 +28590,1310 @@
     <p:extLst>
       <p:ext uri="{BB962C8B-B14F-4D97-AF65-F5344CB8AC3E}">
         <p14:creationId xmlns:p14="http://schemas.microsoft.com/office/powerpoint/2010/main" val="1102396629"/>
+      </p:ext>
+    </p:extLst>
+  </p:cSld>
+  <p:clrMapOvr>
+    <a:masterClrMapping/>
+  </p:clrMapOvr>
+</p:sld>
+</file>
+
+<file path=ppt/slides/slide16.xml><?xml version="1.0" encoding="utf-8"?>
+<p:sld xmlns:a="http://schemas.openxmlformats.org/drawingml/2006/main" xmlns:r="http://schemas.openxmlformats.org/officeDocument/2006/relationships" xmlns:p="http://schemas.openxmlformats.org/presentationml/2006/main">
+  <p:cSld>
+    <p:bg>
+      <p:bgPr>
+        <a:solidFill>
+          <a:schemeClr val="bg1"/>
+        </a:solidFill>
+        <a:effectLst/>
+      </p:bgPr>
+    </p:bg>
+    <p:spTree>
+      <p:nvGrpSpPr>
+        <p:cNvPr id="1" name="">
+          <a:extLst>
+            <a:ext uri="{FF2B5EF4-FFF2-40B4-BE49-F238E27FC236}">
+              <a16:creationId xmlns:a16="http://schemas.microsoft.com/office/drawing/2014/main" id="{11705A28-A448-0815-6B3E-55E6F044FB6E}"/>
+            </a:ext>
+          </a:extLst>
+        </p:cNvPr>
+        <p:cNvGrpSpPr/>
+        <p:nvPr/>
+      </p:nvGrpSpPr>
+      <p:grpSpPr>
+        <a:xfrm>
+          <a:off x="0" y="0"/>
+          <a:ext cx="0" cy="0"/>
+          <a:chOff x="0" y="0"/>
+          <a:chExt cx="0" cy="0"/>
+        </a:xfrm>
+      </p:grpSpPr>
+      <p:sp useBgFill="1">
+        <p:nvSpPr>
+          <p:cNvPr id="8" name="Rectangle 7">
+            <a:extLst>
+              <a:ext uri="{FF2B5EF4-FFF2-40B4-BE49-F238E27FC236}">
+                <a16:creationId xmlns:a16="http://schemas.microsoft.com/office/drawing/2014/main" id="{23C0520C-9E93-53D8-0680-69C9D91A8BF8}"/>
+              </a:ext>
+              <a:ext uri="{C183D7F6-B498-43B3-948B-1728B52AA6E4}">
+                <adec:decorative xmlns:adec="http://schemas.microsoft.com/office/drawing/2017/decorative" val="1"/>
+              </a:ext>
+            </a:extLst>
+          </p:cNvPr>
+          <p:cNvSpPr>
+            <a:spLocks noGrp="1" noRot="1" noChangeAspect="1" noMove="1" noResize="1" noEditPoints="1" noAdjustHandles="1" noChangeArrowheads="1" noChangeShapeType="1" noTextEdit="1"/>
+          </p:cNvSpPr>
+          <p:nvPr>
+            <p:extLst>
+              <p:ext uri="{386F3935-93C4-4BCD-93E2-E3B085C9AB24}">
+                <p16:designElem xmlns:p16="http://schemas.microsoft.com/office/powerpoint/2015/main" val="1"/>
+              </p:ext>
+            </p:extLst>
+          </p:nvPr>
+        </p:nvSpPr>
+        <p:spPr>
+          <a:xfrm>
+            <a:off x="0" y="0"/>
+            <a:ext cx="12192000" cy="6858000"/>
+          </a:xfrm>
+          <a:prstGeom prst="rect">
+            <a:avLst/>
+          </a:prstGeom>
+          <a:ln w="12700" cap="flat" cmpd="sng" algn="ctr">
+            <a:noFill/>
+            <a:prstDash val="solid"/>
+            <a:miter lim="800000"/>
+          </a:ln>
+          <a:effectLst/>
+          <a:extLst>
+            <a:ext uri="{91240B29-F687-4F45-9708-019B960494DF}">
+              <a14:hiddenLine xmlns:a14="http://schemas.microsoft.com/office/drawing/2010/main" w="12700" cap="flat" cmpd="sng" algn="ctr">
+                <a:solidFill>
+                  <a:schemeClr val="accent1">
+                    <a:shade val="50000"/>
+                  </a:schemeClr>
+                </a:solidFill>
+                <a:prstDash val="solid"/>
+                <a:miter lim="800000"/>
+              </a14:hiddenLine>
+            </a:ext>
+          </a:extLst>
+        </p:spPr>
+        <p:style>
+          <a:lnRef idx="2">
+            <a:schemeClr val="accent1">
+              <a:shade val="50000"/>
+            </a:schemeClr>
+          </a:lnRef>
+          <a:fillRef idx="1">
+            <a:schemeClr val="accent1"/>
+          </a:fillRef>
+          <a:effectRef idx="0">
+            <a:schemeClr val="accent1"/>
+          </a:effectRef>
+          <a:fontRef idx="minor">
+            <a:schemeClr val="lt1"/>
+          </a:fontRef>
+        </p:style>
+        <p:txBody>
+          <a:bodyPr rtlCol="0" anchor="ctr"/>
+          <a:lstStyle/>
+          <a:p>
+            <a:pPr algn="ctr"/>
+            <a:endParaRPr lang="en-US"/>
+          </a:p>
+        </p:txBody>
+      </p:sp>
+      <p:sp useBgFill="1">
+        <p:nvSpPr>
+          <p:cNvPr id="10" name="Rectangle 9">
+            <a:extLst>
+              <a:ext uri="{FF2B5EF4-FFF2-40B4-BE49-F238E27FC236}">
+                <a16:creationId xmlns:a16="http://schemas.microsoft.com/office/drawing/2014/main" id="{C16A8439-DB07-944C-752B-639888C40020}"/>
+              </a:ext>
+              <a:ext uri="{C183D7F6-B498-43B3-948B-1728B52AA6E4}">
+                <adec:decorative xmlns:adec="http://schemas.microsoft.com/office/drawing/2017/decorative" val="1"/>
+              </a:ext>
+            </a:extLst>
+          </p:cNvPr>
+          <p:cNvSpPr>
+            <a:spLocks noGrp="1" noRot="1" noChangeAspect="1" noMove="1" noResize="1" noEditPoints="1" noAdjustHandles="1" noChangeArrowheads="1" noChangeShapeType="1" noTextEdit="1"/>
+          </p:cNvSpPr>
+          <p:nvPr>
+            <p:extLst>
+              <p:ext uri="{386F3935-93C4-4BCD-93E2-E3B085C9AB24}">
+                <p16:designElem xmlns:p16="http://schemas.microsoft.com/office/powerpoint/2015/main" val="1"/>
+              </p:ext>
+            </p:extLst>
+          </p:nvPr>
+        </p:nvSpPr>
+        <p:spPr>
+          <a:xfrm>
+            <a:off x="0" y="0"/>
+            <a:ext cx="12188952" cy="6858000"/>
+          </a:xfrm>
+          <a:prstGeom prst="rect">
+            <a:avLst/>
+          </a:prstGeom>
+          <a:ln w="12700" cap="flat" cmpd="sng" algn="ctr">
+            <a:noFill/>
+            <a:prstDash val="solid"/>
+            <a:miter lim="800000"/>
+          </a:ln>
+          <a:effectLst/>
+          <a:extLst>
+            <a:ext uri="{91240B29-F687-4F45-9708-019B960494DF}">
+              <a14:hiddenLine xmlns:a14="http://schemas.microsoft.com/office/drawing/2010/main" w="12700" cap="flat" cmpd="sng" algn="ctr">
+                <a:solidFill>
+                  <a:schemeClr val="accent1">
+                    <a:shade val="50000"/>
+                  </a:schemeClr>
+                </a:solidFill>
+                <a:prstDash val="solid"/>
+                <a:miter lim="800000"/>
+              </a14:hiddenLine>
+            </a:ext>
+          </a:extLst>
+        </p:spPr>
+        <p:style>
+          <a:lnRef idx="2">
+            <a:schemeClr val="accent1">
+              <a:shade val="50000"/>
+            </a:schemeClr>
+          </a:lnRef>
+          <a:fillRef idx="1">
+            <a:schemeClr val="accent1"/>
+          </a:fillRef>
+          <a:effectRef idx="0">
+            <a:schemeClr val="accent1"/>
+          </a:effectRef>
+          <a:fontRef idx="minor">
+            <a:schemeClr val="lt1"/>
+          </a:fontRef>
+        </p:style>
+        <p:txBody>
+          <a:bodyPr rtlCol="0" anchor="ctr"/>
+          <a:lstStyle/>
+          <a:p>
+            <a:pPr algn="ctr"/>
+            <a:endParaRPr lang="en-US"/>
+          </a:p>
+        </p:txBody>
+      </p:sp>
+      <p:sp>
+        <p:nvSpPr>
+          <p:cNvPr id="12" name="Rectangle 11">
+            <a:extLst>
+              <a:ext uri="{FF2B5EF4-FFF2-40B4-BE49-F238E27FC236}">
+                <a16:creationId xmlns:a16="http://schemas.microsoft.com/office/drawing/2014/main" id="{2FF1B1DD-83AD-1B79-2291-4376C0B6C6C6}"/>
+              </a:ext>
+              <a:ext uri="{C183D7F6-B498-43B3-948B-1728B52AA6E4}">
+                <adec:decorative xmlns:adec="http://schemas.microsoft.com/office/drawing/2017/decorative" val="1"/>
+              </a:ext>
+            </a:extLst>
+          </p:cNvPr>
+          <p:cNvSpPr>
+            <a:spLocks noGrp="1" noRot="1" noChangeAspect="1" noMove="1" noResize="1" noEditPoints="1" noAdjustHandles="1" noChangeArrowheads="1" noChangeShapeType="1" noTextEdit="1"/>
+          </p:cNvSpPr>
+          <p:nvPr>
+            <p:extLst>
+              <p:ext uri="{386F3935-93C4-4BCD-93E2-E3B085C9AB24}">
+                <p16:designElem xmlns:p16="http://schemas.microsoft.com/office/powerpoint/2015/main" val="1"/>
+              </p:ext>
+            </p:extLst>
+          </p:nvPr>
+        </p:nvSpPr>
+        <p:spPr>
+          <a:xfrm rot="5400000" flipH="1">
+            <a:off x="-1410084" y="1410082"/>
+            <a:ext cx="6858000" cy="4037836"/>
+          </a:xfrm>
+          <a:prstGeom prst="rect">
+            <a:avLst/>
+          </a:prstGeom>
+          <a:gradFill>
+            <a:gsLst>
+              <a:gs pos="8000">
+                <a:srgbClr val="000000"/>
+              </a:gs>
+              <a:gs pos="100000">
+                <a:schemeClr val="accent1">
+                  <a:lumMod val="75000"/>
+                </a:schemeClr>
+              </a:gs>
+            </a:gsLst>
+            <a:lin ang="3000000" scaled="0"/>
+          </a:gradFill>
+          <a:ln>
+            <a:noFill/>
+          </a:ln>
+        </p:spPr>
+        <p:style>
+          <a:lnRef idx="2">
+            <a:schemeClr val="accent1">
+              <a:shade val="50000"/>
+            </a:schemeClr>
+          </a:lnRef>
+          <a:fillRef idx="1">
+            <a:schemeClr val="accent1"/>
+          </a:fillRef>
+          <a:effectRef idx="0">
+            <a:schemeClr val="accent1"/>
+          </a:effectRef>
+          <a:fontRef idx="minor">
+            <a:schemeClr val="lt1"/>
+          </a:fontRef>
+        </p:style>
+        <p:txBody>
+          <a:bodyPr rtlCol="0" anchor="ctr"/>
+          <a:lstStyle/>
+          <a:p>
+            <a:pPr algn="ctr"/>
+            <a:endParaRPr lang="en-US"/>
+          </a:p>
+        </p:txBody>
+      </p:sp>
+      <p:sp>
+        <p:nvSpPr>
+          <p:cNvPr id="14" name="Rectangle 13">
+            <a:extLst>
+              <a:ext uri="{FF2B5EF4-FFF2-40B4-BE49-F238E27FC236}">
+                <a16:creationId xmlns:a16="http://schemas.microsoft.com/office/drawing/2014/main" id="{54233F58-503D-4702-5EE5-AA5934D882DE}"/>
+              </a:ext>
+              <a:ext uri="{C183D7F6-B498-43B3-948B-1728B52AA6E4}">
+                <adec:decorative xmlns:adec="http://schemas.microsoft.com/office/drawing/2017/decorative" val="1"/>
+              </a:ext>
+            </a:extLst>
+          </p:cNvPr>
+          <p:cNvSpPr>
+            <a:spLocks noGrp="1" noRot="1" noChangeAspect="1" noMove="1" noResize="1" noEditPoints="1" noAdjustHandles="1" noChangeArrowheads="1" noChangeShapeType="1" noTextEdit="1"/>
+          </p:cNvSpPr>
+          <p:nvPr>
+            <p:extLst>
+              <p:ext uri="{386F3935-93C4-4BCD-93E2-E3B085C9AB24}">
+                <p16:designElem xmlns:p16="http://schemas.microsoft.com/office/powerpoint/2015/main" val="1"/>
+              </p:ext>
+            </p:extLst>
+          </p:nvPr>
+        </p:nvSpPr>
+        <p:spPr>
+          <a:xfrm rot="5400000" flipH="1">
+            <a:off x="-1410085" y="1420219"/>
+            <a:ext cx="6857999" cy="4037839"/>
+          </a:xfrm>
+          <a:prstGeom prst="rect">
+            <a:avLst/>
+          </a:prstGeom>
+          <a:gradFill>
+            <a:gsLst>
+              <a:gs pos="0">
+                <a:srgbClr val="000000">
+                  <a:alpha val="0"/>
+                </a:srgbClr>
+              </a:gs>
+              <a:gs pos="99000">
+                <a:schemeClr val="accent1">
+                  <a:alpha val="46000"/>
+                </a:schemeClr>
+              </a:gs>
+            </a:gsLst>
+            <a:lin ang="1800000" scaled="0"/>
+          </a:gradFill>
+          <a:ln>
+            <a:noFill/>
+          </a:ln>
+        </p:spPr>
+        <p:style>
+          <a:lnRef idx="2">
+            <a:schemeClr val="accent1">
+              <a:shade val="50000"/>
+            </a:schemeClr>
+          </a:lnRef>
+          <a:fillRef idx="1">
+            <a:schemeClr val="accent1"/>
+          </a:fillRef>
+          <a:effectRef idx="0">
+            <a:schemeClr val="accent1"/>
+          </a:effectRef>
+          <a:fontRef idx="minor">
+            <a:schemeClr val="lt1"/>
+          </a:fontRef>
+        </p:style>
+        <p:txBody>
+          <a:bodyPr rtlCol="0" anchor="ctr"/>
+          <a:lstStyle/>
+          <a:p>
+            <a:pPr algn="ctr"/>
+            <a:endParaRPr lang="en-US"/>
+          </a:p>
+        </p:txBody>
+      </p:sp>
+      <p:sp>
+        <p:nvSpPr>
+          <p:cNvPr id="16" name="Rectangle 15">
+            <a:extLst>
+              <a:ext uri="{FF2B5EF4-FFF2-40B4-BE49-F238E27FC236}">
+                <a16:creationId xmlns:a16="http://schemas.microsoft.com/office/drawing/2014/main" id="{1EEB2B0F-2992-80F1-0D66-FB2992606251}"/>
+              </a:ext>
+              <a:ext uri="{C183D7F6-B498-43B3-948B-1728B52AA6E4}">
+                <adec:decorative xmlns:adec="http://schemas.microsoft.com/office/drawing/2017/decorative" val="1"/>
+              </a:ext>
+            </a:extLst>
+          </p:cNvPr>
+          <p:cNvSpPr>
+            <a:spLocks noGrp="1" noRot="1" noChangeAspect="1" noMove="1" noResize="1" noEditPoints="1" noAdjustHandles="1" noChangeArrowheads="1" noChangeShapeType="1" noTextEdit="1"/>
+          </p:cNvSpPr>
+          <p:nvPr>
+            <p:extLst>
+              <p:ext uri="{386F3935-93C4-4BCD-93E2-E3B085C9AB24}">
+                <p16:designElem xmlns:p16="http://schemas.microsoft.com/office/powerpoint/2015/main" val="1"/>
+              </p:ext>
+            </p:extLst>
+          </p:nvPr>
+        </p:nvSpPr>
+        <p:spPr>
+          <a:xfrm rot="5400000" flipH="1">
+            <a:off x="767923" y="3588085"/>
+            <a:ext cx="2501979" cy="4037841"/>
+          </a:xfrm>
+          <a:prstGeom prst="rect">
+            <a:avLst/>
+          </a:prstGeom>
+          <a:gradFill>
+            <a:gsLst>
+              <a:gs pos="2000">
+                <a:schemeClr val="accent1">
+                  <a:alpha val="29000"/>
+                </a:schemeClr>
+              </a:gs>
+              <a:gs pos="100000">
+                <a:srgbClr val="000000">
+                  <a:alpha val="30000"/>
+                </a:srgbClr>
+              </a:gs>
+            </a:gsLst>
+            <a:lin ang="7800000" scaled="0"/>
+          </a:gradFill>
+          <a:ln>
+            <a:noFill/>
+          </a:ln>
+        </p:spPr>
+        <p:style>
+          <a:lnRef idx="2">
+            <a:schemeClr val="accent1">
+              <a:shade val="50000"/>
+            </a:schemeClr>
+          </a:lnRef>
+          <a:fillRef idx="1">
+            <a:schemeClr val="accent1"/>
+          </a:fillRef>
+          <a:effectRef idx="0">
+            <a:schemeClr val="accent1"/>
+          </a:effectRef>
+          <a:fontRef idx="minor">
+            <a:schemeClr val="lt1"/>
+          </a:fontRef>
+        </p:style>
+        <p:txBody>
+          <a:bodyPr rtlCol="0" anchor="ctr"/>
+          <a:lstStyle/>
+          <a:p>
+            <a:pPr algn="ctr"/>
+            <a:endParaRPr lang="en-US" dirty="0"/>
+          </a:p>
+        </p:txBody>
+      </p:sp>
+      <p:sp>
+        <p:nvSpPr>
+          <p:cNvPr id="18" name="Freeform: Shape 17">
+            <a:extLst>
+              <a:ext uri="{FF2B5EF4-FFF2-40B4-BE49-F238E27FC236}">
+                <a16:creationId xmlns:a16="http://schemas.microsoft.com/office/drawing/2014/main" id="{525BC763-94DB-90B0-064F-6C281869CFF3}"/>
+              </a:ext>
+              <a:ext uri="{C183D7F6-B498-43B3-948B-1728B52AA6E4}">
+                <adec:decorative xmlns:adec="http://schemas.microsoft.com/office/drawing/2017/decorative" val="1"/>
+              </a:ext>
+            </a:extLst>
+          </p:cNvPr>
+          <p:cNvSpPr>
+            <a:spLocks noGrp="1" noRot="1" noChangeAspect="1" noMove="1" noResize="1" noEditPoints="1" noAdjustHandles="1" noChangeArrowheads="1" noChangeShapeType="1" noTextEdit="1"/>
+          </p:cNvSpPr>
+          <p:nvPr>
+            <p:extLst>
+              <p:ext uri="{386F3935-93C4-4BCD-93E2-E3B085C9AB24}">
+                <p16:designElem xmlns:p16="http://schemas.microsoft.com/office/powerpoint/2015/main" val="1"/>
+              </p:ext>
+            </p:extLst>
+          </p:nvPr>
+        </p:nvSpPr>
+        <p:spPr>
+          <a:xfrm rot="20635413">
+            <a:off x="-501737" y="969718"/>
+            <a:ext cx="3900357" cy="4178958"/>
+          </a:xfrm>
+          <a:custGeom>
+            <a:avLst/>
+            <a:gdLst>
+              <a:gd name="connsiteX0" fmla="*/ 2432225 w 3900357"/>
+              <a:gd name="connsiteY0" fmla="*/ 93939 h 4178958"/>
+              <a:gd name="connsiteX1" fmla="*/ 3900357 w 3900357"/>
+              <a:gd name="connsiteY1" fmla="*/ 2089479 h 4178958"/>
+              <a:gd name="connsiteX2" fmla="*/ 1810878 w 3900357"/>
+              <a:gd name="connsiteY2" fmla="*/ 4178958 h 4178958"/>
+              <a:gd name="connsiteX3" fmla="*/ 78249 w 3900357"/>
+              <a:gd name="connsiteY3" fmla="*/ 3257727 h 4178958"/>
+              <a:gd name="connsiteX4" fmla="*/ 0 w 3900357"/>
+              <a:gd name="connsiteY4" fmla="*/ 3128923 h 4178958"/>
+              <a:gd name="connsiteX5" fmla="*/ 831324 w 3900357"/>
+              <a:gd name="connsiteY5" fmla="*/ 244281 h 4178958"/>
+              <a:gd name="connsiteX6" fmla="*/ 997559 w 3900357"/>
+              <a:gd name="connsiteY6" fmla="*/ 164202 h 4178958"/>
+              <a:gd name="connsiteX7" fmla="*/ 1810878 w 3900357"/>
+              <a:gd name="connsiteY7" fmla="*/ 0 h 4178958"/>
+              <a:gd name="connsiteX8" fmla="*/ 2432225 w 3900357"/>
+              <a:gd name="connsiteY8" fmla="*/ 93939 h 4178958"/>
+            </a:gdLst>
+            <a:ahLst/>
+            <a:cxnLst>
+              <a:cxn ang="0">
+                <a:pos x="connsiteX0" y="connsiteY0"/>
+              </a:cxn>
+              <a:cxn ang="0">
+                <a:pos x="connsiteX1" y="connsiteY1"/>
+              </a:cxn>
+              <a:cxn ang="0">
+                <a:pos x="connsiteX2" y="connsiteY2"/>
+              </a:cxn>
+              <a:cxn ang="0">
+                <a:pos x="connsiteX3" y="connsiteY3"/>
+              </a:cxn>
+              <a:cxn ang="0">
+                <a:pos x="connsiteX4" y="connsiteY4"/>
+              </a:cxn>
+              <a:cxn ang="0">
+                <a:pos x="connsiteX5" y="connsiteY5"/>
+              </a:cxn>
+              <a:cxn ang="0">
+                <a:pos x="connsiteX6" y="connsiteY6"/>
+              </a:cxn>
+              <a:cxn ang="0">
+                <a:pos x="connsiteX7" y="connsiteY7"/>
+              </a:cxn>
+              <a:cxn ang="0">
+                <a:pos x="connsiteX8" y="connsiteY8"/>
+              </a:cxn>
+            </a:cxnLst>
+            <a:rect l="l" t="t" r="r" b="b"/>
+            <a:pathLst>
+              <a:path w="3900357" h="4178958">
+                <a:moveTo>
+                  <a:pt x="2432225" y="93939"/>
+                </a:moveTo>
+                <a:cubicBezTo>
+                  <a:pt x="3282786" y="358491"/>
+                  <a:pt x="3900357" y="1151865"/>
+                  <a:pt x="3900357" y="2089479"/>
+                </a:cubicBezTo>
+                <a:cubicBezTo>
+                  <a:pt x="3900357" y="3243466"/>
+                  <a:pt x="2964865" y="4178958"/>
+                  <a:pt x="1810878" y="4178958"/>
+                </a:cubicBezTo>
+                <a:cubicBezTo>
+                  <a:pt x="1089636" y="4178958"/>
+                  <a:pt x="453744" y="3813531"/>
+                  <a:pt x="78249" y="3257727"/>
+                </a:cubicBezTo>
+                <a:lnTo>
+                  <a:pt x="0" y="3128923"/>
+                </a:lnTo>
+                <a:lnTo>
+                  <a:pt x="831324" y="244281"/>
+                </a:lnTo>
+                <a:lnTo>
+                  <a:pt x="997559" y="164202"/>
+                </a:lnTo>
+                <a:cubicBezTo>
+                  <a:pt x="1247540" y="58468"/>
+                  <a:pt x="1522381" y="0"/>
+                  <a:pt x="1810878" y="0"/>
+                </a:cubicBezTo>
+                <a:cubicBezTo>
+                  <a:pt x="2027251" y="0"/>
+                  <a:pt x="2235942" y="32888"/>
+                  <a:pt x="2432225" y="93939"/>
+                </a:cubicBezTo>
+                <a:close/>
+              </a:path>
+            </a:pathLst>
+          </a:custGeom>
+          <a:gradFill>
+            <a:gsLst>
+              <a:gs pos="29000">
+                <a:srgbClr val="000000">
+                  <a:alpha val="0"/>
+                </a:srgbClr>
+              </a:gs>
+              <a:gs pos="100000">
+                <a:schemeClr val="accent1">
+                  <a:alpha val="43000"/>
+                </a:schemeClr>
+              </a:gs>
+            </a:gsLst>
+            <a:lin ang="1800000" scaled="0"/>
+          </a:gradFill>
+          <a:ln>
+            <a:noFill/>
+          </a:ln>
+        </p:spPr>
+        <p:style>
+          <a:lnRef idx="2">
+            <a:schemeClr val="accent1">
+              <a:shade val="50000"/>
+            </a:schemeClr>
+          </a:lnRef>
+          <a:fillRef idx="1">
+            <a:schemeClr val="accent1"/>
+          </a:fillRef>
+          <a:effectRef idx="0">
+            <a:schemeClr val="accent1"/>
+          </a:effectRef>
+          <a:fontRef idx="minor">
+            <a:schemeClr val="lt1"/>
+          </a:fontRef>
+        </p:style>
+        <p:txBody>
+          <a:bodyPr wrap="square" rtlCol="0" anchor="ctr">
+            <a:noAutofit/>
+          </a:bodyPr>
+          <a:lstStyle/>
+          <a:p>
+            <a:pPr algn="ctr"/>
+            <a:endParaRPr lang="en-US" dirty="0"/>
+          </a:p>
+        </p:txBody>
+      </p:sp>
+      <p:sp>
+        <p:nvSpPr>
+          <p:cNvPr id="20" name="Rectangle 19">
+            <a:extLst>
+              <a:ext uri="{FF2B5EF4-FFF2-40B4-BE49-F238E27FC236}">
+                <a16:creationId xmlns:a16="http://schemas.microsoft.com/office/drawing/2014/main" id="{801C5FC6-BEB5-CCCE-2CBE-E5E8BB99BE00}"/>
+              </a:ext>
+              <a:ext uri="{C183D7F6-B498-43B3-948B-1728B52AA6E4}">
+                <adec:decorative xmlns:adec="http://schemas.microsoft.com/office/drawing/2017/decorative" val="1"/>
+              </a:ext>
+            </a:extLst>
+          </p:cNvPr>
+          <p:cNvSpPr>
+            <a:spLocks noGrp="1" noRot="1" noChangeAspect="1" noMove="1" noResize="1" noEditPoints="1" noAdjustHandles="1" noChangeArrowheads="1" noChangeShapeType="1" noTextEdit="1"/>
+          </p:cNvSpPr>
+          <p:nvPr>
+            <p:extLst>
+              <p:ext uri="{386F3935-93C4-4BCD-93E2-E3B085C9AB24}">
+                <p16:designElem xmlns:p16="http://schemas.microsoft.com/office/powerpoint/2015/main" val="1"/>
+              </p:ext>
+            </p:extLst>
+          </p:nvPr>
+        </p:nvSpPr>
+        <p:spPr>
+          <a:xfrm rot="5400000" flipH="1">
+            <a:off x="-1410093" y="1399943"/>
+            <a:ext cx="6858003" cy="4037835"/>
+          </a:xfrm>
+          <a:prstGeom prst="rect">
+            <a:avLst/>
+          </a:prstGeom>
+          <a:gradFill>
+            <a:gsLst>
+              <a:gs pos="0">
+                <a:srgbClr val="000000">
+                  <a:alpha val="0"/>
+                </a:srgbClr>
+              </a:gs>
+              <a:gs pos="99000">
+                <a:schemeClr val="accent1">
+                  <a:lumMod val="60000"/>
+                  <a:lumOff val="40000"/>
+                  <a:alpha val="11000"/>
+                </a:schemeClr>
+              </a:gs>
+            </a:gsLst>
+            <a:lin ang="7200000" scaled="0"/>
+          </a:gradFill>
+          <a:ln>
+            <a:noFill/>
+          </a:ln>
+        </p:spPr>
+        <p:style>
+          <a:lnRef idx="2">
+            <a:schemeClr val="accent1">
+              <a:shade val="50000"/>
+            </a:schemeClr>
+          </a:lnRef>
+          <a:fillRef idx="1">
+            <a:schemeClr val="accent1"/>
+          </a:fillRef>
+          <a:effectRef idx="0">
+            <a:schemeClr val="accent1"/>
+          </a:effectRef>
+          <a:fontRef idx="minor">
+            <a:schemeClr val="lt1"/>
+          </a:fontRef>
+        </p:style>
+        <p:txBody>
+          <a:bodyPr rtlCol="0" anchor="ctr"/>
+          <a:lstStyle/>
+          <a:p>
+            <a:pPr algn="ctr"/>
+            <a:endParaRPr lang="en-US"/>
+          </a:p>
+        </p:txBody>
+      </p:sp>
+      <p:sp>
+        <p:nvSpPr>
+          <p:cNvPr id="6" name="TextBox 5">
+            <a:extLst>
+              <a:ext uri="{FF2B5EF4-FFF2-40B4-BE49-F238E27FC236}">
+                <a16:creationId xmlns:a16="http://schemas.microsoft.com/office/drawing/2014/main" id="{16A5E477-5AC0-E330-5900-07ED49CA3D06}"/>
+              </a:ext>
+            </a:extLst>
+          </p:cNvPr>
+          <p:cNvSpPr txBox="1"/>
+          <p:nvPr/>
+        </p:nvSpPr>
+        <p:spPr>
+          <a:xfrm flipH="1">
+            <a:off x="500180" y="3440738"/>
+            <a:ext cx="3037453" cy="1815882"/>
+          </a:xfrm>
+          <a:prstGeom prst="rect">
+            <a:avLst/>
+          </a:prstGeom>
+          <a:noFill/>
+        </p:spPr>
+        <p:txBody>
+          <a:bodyPr wrap="square" lIns="91440" tIns="45720" rIns="91440" bIns="45720" rtlCol="0" anchor="t">
+            <a:spAutoFit/>
+          </a:bodyPr>
+          <a:lstStyle/>
+          <a:p>
+            <a:pPr algn="ctr">
+              <a:defRPr/>
+            </a:pPr>
+            <a:r>
+              <a:rPr lang="en-US" sz="2400" b="1" dirty="0">
+                <a:solidFill>
+                  <a:srgbClr val="FFFFFF"/>
+                </a:solidFill>
+                <a:latin typeface="Graphik"/>
+              </a:rPr>
+              <a:t>Kenny Copas</a:t>
+            </a:r>
+          </a:p>
+          <a:p>
+            <a:pPr algn="ctr">
+              <a:defRPr/>
+            </a:pPr>
+            <a:endParaRPr lang="en-US" sz="2400" b="1" dirty="0">
+              <a:solidFill>
+                <a:srgbClr val="FFFFFF"/>
+              </a:solidFill>
+              <a:latin typeface="Graphik"/>
+            </a:endParaRPr>
+          </a:p>
+          <a:p>
+            <a:pPr marL="0" marR="0" lvl="0" indent="0" algn="ctr" defTabSz="914400" rtl="0" eaLnBrk="1" fontAlgn="auto" latinLnBrk="0" hangingPunct="1">
+              <a:lnSpc>
+                <a:spcPct val="100000"/>
+              </a:lnSpc>
+              <a:spcBef>
+                <a:spcPts val="0"/>
+              </a:spcBef>
+              <a:spcAft>
+                <a:spcPts val="0"/>
+              </a:spcAft>
+              <a:buClrTx/>
+              <a:buSzTx/>
+              <a:buFontTx/>
+              <a:buNone/>
+              <a:tabLst/>
+              <a:defRPr/>
+            </a:pPr>
+            <a:r>
+              <a:rPr kumimoji="0" lang="en-US" sz="1600" b="0" i="0" u="none" strike="noStrike" kern="1200" cap="none" spc="0" normalizeH="0" baseline="0" noProof="0" dirty="0">
+                <a:ln>
+                  <a:noFill/>
+                </a:ln>
+                <a:solidFill>
+                  <a:srgbClr val="FFFFFF"/>
+                </a:solidFill>
+                <a:effectLst/>
+                <a:uLnTx/>
+                <a:uFillTx/>
+                <a:latin typeface="Graphik"/>
+                <a:ea typeface="+mn-ea"/>
+                <a:cs typeface="+mn-cs"/>
+              </a:rPr>
+              <a:t>Jr. Data Engineer</a:t>
+            </a:r>
+          </a:p>
+          <a:p>
+            <a:pPr marL="0" marR="0" lvl="0" indent="0" algn="ctr" defTabSz="914400" rtl="0" eaLnBrk="1" fontAlgn="auto" latinLnBrk="0" hangingPunct="1">
+              <a:lnSpc>
+                <a:spcPct val="100000"/>
+              </a:lnSpc>
+              <a:spcBef>
+                <a:spcPts val="0"/>
+              </a:spcBef>
+              <a:spcAft>
+                <a:spcPts val="0"/>
+              </a:spcAft>
+              <a:buClrTx/>
+              <a:buSzTx/>
+              <a:buFontTx/>
+              <a:buNone/>
+              <a:tabLst/>
+              <a:defRPr/>
+            </a:pPr>
+            <a:endParaRPr kumimoji="0" lang="en-US" sz="1600" b="0" i="0" u="none" strike="noStrike" kern="1200" cap="none" spc="0" normalizeH="0" baseline="0" noProof="0" dirty="0">
+              <a:ln>
+                <a:noFill/>
+              </a:ln>
+              <a:solidFill>
+                <a:srgbClr val="FFFFFF"/>
+              </a:solidFill>
+              <a:effectLst/>
+              <a:uLnTx/>
+              <a:uFillTx/>
+              <a:latin typeface="Graphik"/>
+              <a:ea typeface="+mn-ea"/>
+              <a:cs typeface="+mn-cs"/>
+            </a:endParaRPr>
+          </a:p>
+          <a:p>
+            <a:pPr marL="0" marR="0" lvl="0" indent="0" algn="ctr" defTabSz="914400" rtl="0" eaLnBrk="1" fontAlgn="auto" latinLnBrk="0" hangingPunct="1">
+              <a:lnSpc>
+                <a:spcPct val="100000"/>
+              </a:lnSpc>
+              <a:spcBef>
+                <a:spcPts val="0"/>
+              </a:spcBef>
+              <a:spcAft>
+                <a:spcPts val="0"/>
+              </a:spcAft>
+              <a:buClrTx/>
+              <a:buSzTx/>
+              <a:buFontTx/>
+              <a:buNone/>
+              <a:tabLst/>
+              <a:defRPr/>
+            </a:pPr>
+            <a:r>
+              <a:rPr kumimoji="0" lang="en-US" sz="1600" b="0" i="0" u="none" strike="noStrike" kern="1200" cap="none" spc="0" normalizeH="0" baseline="0" noProof="0" dirty="0">
+                <a:ln>
+                  <a:noFill/>
+                </a:ln>
+                <a:solidFill>
+                  <a:srgbClr val="FFFFFF"/>
+                </a:solidFill>
+                <a:effectLst/>
+                <a:uLnTx/>
+                <a:uFillTx/>
+                <a:latin typeface="Graphik"/>
+                <a:ea typeface="+mn-ea"/>
+                <a:cs typeface="+mn-cs"/>
+              </a:rPr>
+              <a:t>PeopleShores PBC</a:t>
+            </a:r>
+          </a:p>
+          <a:p>
+            <a:pPr marL="0" marR="0" lvl="0" indent="0" algn="ctr" defTabSz="914400" rtl="0" eaLnBrk="1" fontAlgn="auto" latinLnBrk="0" hangingPunct="1">
+              <a:lnSpc>
+                <a:spcPct val="100000"/>
+              </a:lnSpc>
+              <a:spcBef>
+                <a:spcPts val="0"/>
+              </a:spcBef>
+              <a:spcAft>
+                <a:spcPts val="0"/>
+              </a:spcAft>
+              <a:buClrTx/>
+              <a:buSzTx/>
+              <a:buFontTx/>
+              <a:buNone/>
+              <a:tabLst/>
+              <a:defRPr/>
+            </a:pPr>
+            <a:r>
+              <a:rPr lang="en-US" sz="1600" dirty="0">
+                <a:solidFill>
+                  <a:srgbClr val="FFFFFF"/>
+                </a:solidFill>
+                <a:latin typeface="Graphik"/>
+              </a:rPr>
+              <a:t>Tampa, FL</a:t>
+            </a:r>
+            <a:endParaRPr kumimoji="0" lang="en-US" sz="1600" b="0" i="0" u="none" strike="noStrike" kern="1200" cap="none" spc="0" normalizeH="0" baseline="0" noProof="0" dirty="0">
+              <a:ln>
+                <a:noFill/>
+              </a:ln>
+              <a:solidFill>
+                <a:srgbClr val="FFFFFF"/>
+              </a:solidFill>
+              <a:effectLst/>
+              <a:uLnTx/>
+              <a:uFillTx/>
+              <a:latin typeface="Graphik" panose="020B0503030202060203" pitchFamily="34" charset="0"/>
+              <a:ea typeface="+mn-ea"/>
+              <a:cs typeface="+mn-cs"/>
+            </a:endParaRPr>
+          </a:p>
+        </p:txBody>
+      </p:sp>
+      <p:pic>
+        <p:nvPicPr>
+          <p:cNvPr id="3" name="Picture 2" descr="A person taking a selfie&#10;&#10;AI-generated content may be incorrect.">
+            <a:extLst>
+              <a:ext uri="{FF2B5EF4-FFF2-40B4-BE49-F238E27FC236}">
+                <a16:creationId xmlns:a16="http://schemas.microsoft.com/office/drawing/2014/main" id="{83054ED2-4129-B083-C08A-FAB42B542FB7}"/>
+              </a:ext>
+            </a:extLst>
+          </p:cNvPr>
+          <p:cNvPicPr>
+            <a:picLocks noChangeAspect="1"/>
+          </p:cNvPicPr>
+          <p:nvPr/>
+        </p:nvPicPr>
+        <p:blipFill rotWithShape="1">
+          <a:blip r:embed="rId3">
+            <a:extLst>
+              <a:ext uri="{28A0092B-C50C-407E-A947-70E740481C1C}">
+                <a14:useLocalDpi xmlns:a14="http://schemas.microsoft.com/office/drawing/2010/main" val="0"/>
+              </a:ext>
+            </a:extLst>
+          </a:blip>
+          <a:srcRect t="12049" b="1445"/>
+          <a:stretch/>
+        </p:blipFill>
+        <p:spPr>
+          <a:xfrm>
+            <a:off x="818319" y="581926"/>
+            <a:ext cx="2401173" cy="2401173"/>
+          </a:xfrm>
+          <a:prstGeom prst="ellipse">
+            <a:avLst/>
+          </a:prstGeom>
+        </p:spPr>
+      </p:pic>
+      <p:sp>
+        <p:nvSpPr>
+          <p:cNvPr id="2" name="Title 1">
+            <a:extLst>
+              <a:ext uri="{FF2B5EF4-FFF2-40B4-BE49-F238E27FC236}">
+                <a16:creationId xmlns:a16="http://schemas.microsoft.com/office/drawing/2014/main" id="{635360F9-5A89-B78D-74B2-CD2ABE5702B8}"/>
+              </a:ext>
+            </a:extLst>
+          </p:cNvPr>
+          <p:cNvSpPr>
+            <a:spLocks noGrp="1"/>
+          </p:cNvSpPr>
+          <p:nvPr>
+            <p:ph type="title"/>
+          </p:nvPr>
+        </p:nvSpPr>
+        <p:spPr>
+          <a:xfrm>
+            <a:off x="5329378" y="318949"/>
+            <a:ext cx="5568013" cy="682611"/>
+          </a:xfrm>
+        </p:spPr>
+        <p:txBody>
+          <a:bodyPr>
+            <a:normAutofit/>
+          </a:bodyPr>
+          <a:lstStyle/>
+          <a:p>
+            <a:pPr lvl="0" defTabSz="914377">
+              <a:lnSpc>
+                <a:spcPct val="80000"/>
+              </a:lnSpc>
+              <a:defRPr/>
+            </a:pPr>
+            <a:r>
+              <a:rPr lang="en-US" sz="3500" b="1" dirty="0">
+                <a:solidFill>
+                  <a:srgbClr val="000000"/>
+                </a:solidFill>
+                <a:latin typeface="Graphik"/>
+              </a:rPr>
+              <a:t>Thank you for your time!</a:t>
+            </a:r>
+          </a:p>
+        </p:txBody>
+      </p:sp>
+      <p:grpSp>
+        <p:nvGrpSpPr>
+          <p:cNvPr id="37" name="Group 36">
+            <a:extLst>
+              <a:ext uri="{FF2B5EF4-FFF2-40B4-BE49-F238E27FC236}">
+                <a16:creationId xmlns:a16="http://schemas.microsoft.com/office/drawing/2014/main" id="{4FA913BA-EF93-1DB3-96B2-D5D033300339}"/>
+              </a:ext>
+            </a:extLst>
+          </p:cNvPr>
+          <p:cNvGrpSpPr/>
+          <p:nvPr/>
+        </p:nvGrpSpPr>
+        <p:grpSpPr>
+          <a:xfrm>
+            <a:off x="8235760" y="3949691"/>
+            <a:ext cx="3456060" cy="2685976"/>
+            <a:chOff x="4560834" y="3875264"/>
+            <a:chExt cx="3776282" cy="2934846"/>
+          </a:xfrm>
+        </p:grpSpPr>
+        <p:grpSp>
+          <p:nvGrpSpPr>
+            <p:cNvPr id="31" name="Group 30">
+              <a:extLst>
+                <a:ext uri="{FF2B5EF4-FFF2-40B4-BE49-F238E27FC236}">
+                  <a16:creationId xmlns:a16="http://schemas.microsoft.com/office/drawing/2014/main" id="{99DC67EB-EEE2-2510-7FFB-E91212BBAD08}"/>
+                </a:ext>
+              </a:extLst>
+            </p:cNvPr>
+            <p:cNvGrpSpPr/>
+            <p:nvPr/>
+          </p:nvGrpSpPr>
+          <p:grpSpPr>
+            <a:xfrm>
+              <a:off x="5249678" y="4264872"/>
+              <a:ext cx="2584618" cy="2545238"/>
+              <a:chOff x="9107884" y="1598613"/>
+              <a:chExt cx="1869000" cy="1840525"/>
+            </a:xfrm>
+          </p:grpSpPr>
+          <p:pic>
+            <p:nvPicPr>
+              <p:cNvPr id="26" name="Picture 25" descr="A qr code with a few black squares&#10;&#10;AI-generated content may be incorrect.">
+                <a:extLst>
+                  <a:ext uri="{FF2B5EF4-FFF2-40B4-BE49-F238E27FC236}">
+                    <a16:creationId xmlns:a16="http://schemas.microsoft.com/office/drawing/2014/main" id="{E49FD8E9-A379-EC58-54A4-283C20313E13}"/>
+                  </a:ext>
+                </a:extLst>
+              </p:cNvPr>
+              <p:cNvPicPr>
+                <a:picLocks noChangeAspect="1"/>
+              </p:cNvPicPr>
+              <p:nvPr/>
+            </p:nvPicPr>
+            <p:blipFill>
+              <a:blip r:embed="rId4">
+                <a:extLst>
+                  <a:ext uri="{28A0092B-C50C-407E-A947-70E740481C1C}">
+                    <a14:useLocalDpi xmlns:a14="http://schemas.microsoft.com/office/drawing/2010/main" val="0"/>
+                  </a:ext>
+                </a:extLst>
+              </a:blip>
+              <a:stretch>
+                <a:fillRect/>
+              </a:stretch>
+            </p:blipFill>
+            <p:spPr>
+              <a:xfrm>
+                <a:off x="9107884" y="1598613"/>
+                <a:ext cx="1666875" cy="1659857"/>
+              </a:xfrm>
+              <a:prstGeom prst="rect">
+                <a:avLst/>
+              </a:prstGeom>
+            </p:spPr>
+          </p:pic>
+          <p:pic>
+            <p:nvPicPr>
+              <p:cNvPr id="1064" name="Picture 40" descr="LinkedIn">
+                <a:extLst>
+                  <a:ext uri="{FF2B5EF4-FFF2-40B4-BE49-F238E27FC236}">
+                    <a16:creationId xmlns:a16="http://schemas.microsoft.com/office/drawing/2014/main" id="{18D658CC-733E-A833-7A8B-C47C04D67BE3}"/>
+                  </a:ext>
+                </a:extLst>
+              </p:cNvPr>
+              <p:cNvPicPr>
+                <a:picLocks noChangeAspect="1" noChangeArrowheads="1"/>
+              </p:cNvPicPr>
+              <p:nvPr/>
+            </p:nvPicPr>
+            <p:blipFill>
+              <a:blip r:embed="rId5">
+                <a:extLst>
+                  <a:ext uri="{28A0092B-C50C-407E-A947-70E740481C1C}">
+                    <a14:useLocalDpi xmlns:a14="http://schemas.microsoft.com/office/drawing/2010/main" val="0"/>
+                  </a:ext>
+                </a:extLst>
+              </a:blip>
+              <a:srcRect/>
+              <a:stretch>
+                <a:fillRect/>
+              </a:stretch>
+            </p:blipFill>
+            <p:spPr bwMode="auto">
+              <a:xfrm>
+                <a:off x="10411872" y="2874126"/>
+                <a:ext cx="565012" cy="565012"/>
+              </a:xfrm>
+              <a:prstGeom prst="flowChartConnector">
+                <a:avLst/>
+              </a:prstGeom>
+              <a:noFill/>
+              <a:ln w="19050">
+                <a:solidFill>
+                  <a:schemeClr val="bg2">
+                    <a:lumMod val="10000"/>
+                  </a:schemeClr>
+                </a:solidFill>
+              </a:ln>
+              <a:effectLst>
+                <a:outerShdw blurRad="50800" dist="38100" dir="2700000" algn="tl" rotWithShape="0">
+                  <a:prstClr val="black">
+                    <a:alpha val="40000"/>
+                  </a:prstClr>
+                </a:outerShdw>
+              </a:effectLst>
+              <a:extLst>
+                <a:ext uri="{909E8E84-426E-40DD-AFC4-6F175D3DCCD1}">
+                  <a14:hiddenFill xmlns:a14="http://schemas.microsoft.com/office/drawing/2010/main">
+                    <a:solidFill>
+                      <a:srgbClr val="FFFFFF"/>
+                    </a:solidFill>
+                  </a14:hiddenFill>
+                </a:ext>
+              </a:extLst>
+            </p:spPr>
+          </p:pic>
+        </p:grpSp>
+        <p:sp>
+          <p:nvSpPr>
+            <p:cNvPr id="33" name="TextBox 32">
+              <a:extLst>
+                <a:ext uri="{FF2B5EF4-FFF2-40B4-BE49-F238E27FC236}">
+                  <a16:creationId xmlns:a16="http://schemas.microsoft.com/office/drawing/2014/main" id="{4C7EE61A-0E1F-F823-F612-AF78A3250F4F}"/>
+                </a:ext>
+              </a:extLst>
+            </p:cNvPr>
+            <p:cNvSpPr txBox="1"/>
+            <p:nvPr/>
+          </p:nvSpPr>
+          <p:spPr>
+            <a:xfrm>
+              <a:off x="4560834" y="3875264"/>
+              <a:ext cx="3776282" cy="307777"/>
+            </a:xfrm>
+            <a:prstGeom prst="rect">
+              <a:avLst/>
+            </a:prstGeom>
+            <a:noFill/>
+          </p:spPr>
+          <p:txBody>
+            <a:bodyPr wrap="square">
+              <a:spAutoFit/>
+            </a:bodyPr>
+            <a:lstStyle/>
+            <a:p>
+              <a:pPr algn="ctr">
+                <a:defRPr/>
+              </a:pPr>
+              <a:r>
+                <a:rPr lang="en-US" sz="1400" b="1" dirty="0">
+                  <a:latin typeface="Graphik"/>
+                  <a:ea typeface="Calibri"/>
+                  <a:cs typeface="Calibri"/>
+                </a:rPr>
+                <a:t>linkedin.com/in/kennycopas</a:t>
+              </a:r>
+            </a:p>
+          </p:txBody>
+        </p:sp>
+      </p:grpSp>
+      <p:grpSp>
+        <p:nvGrpSpPr>
+          <p:cNvPr id="36" name="Group 35">
+            <a:extLst>
+              <a:ext uri="{FF2B5EF4-FFF2-40B4-BE49-F238E27FC236}">
+                <a16:creationId xmlns:a16="http://schemas.microsoft.com/office/drawing/2014/main" id="{D732341D-6569-1B97-53D1-9A6A19F5E1B3}"/>
+              </a:ext>
+            </a:extLst>
+          </p:cNvPr>
+          <p:cNvGrpSpPr/>
+          <p:nvPr/>
+        </p:nvGrpSpPr>
+        <p:grpSpPr>
+          <a:xfrm>
+            <a:off x="8356901" y="1066566"/>
+            <a:ext cx="3213778" cy="2605854"/>
+            <a:chOff x="4651692" y="1070666"/>
+            <a:chExt cx="3594566" cy="2914613"/>
+          </a:xfrm>
+        </p:grpSpPr>
+        <p:grpSp>
+          <p:nvGrpSpPr>
+            <p:cNvPr id="30" name="Group 29">
+              <a:extLst>
+                <a:ext uri="{FF2B5EF4-FFF2-40B4-BE49-F238E27FC236}">
+                  <a16:creationId xmlns:a16="http://schemas.microsoft.com/office/drawing/2014/main" id="{CB07CE06-4683-17F0-BC6A-4EE71794A763}"/>
+                </a:ext>
+              </a:extLst>
+            </p:cNvPr>
+            <p:cNvGrpSpPr/>
+            <p:nvPr/>
+          </p:nvGrpSpPr>
+          <p:grpSpPr>
+            <a:xfrm>
+              <a:off x="5146456" y="1320509"/>
+              <a:ext cx="2687840" cy="2664770"/>
+              <a:chOff x="6892267" y="1524877"/>
+              <a:chExt cx="1943642" cy="1926961"/>
+            </a:xfrm>
+          </p:grpSpPr>
+          <p:pic>
+            <p:nvPicPr>
+              <p:cNvPr id="13" name="Picture 12" descr="A qr code with a few black squares&#10;&#10;AI-generated content may be incorrect.">
+                <a:extLst>
+                  <a:ext uri="{FF2B5EF4-FFF2-40B4-BE49-F238E27FC236}">
+                    <a16:creationId xmlns:a16="http://schemas.microsoft.com/office/drawing/2014/main" id="{63BD264B-F1EE-CD88-392C-04D4A5886CCA}"/>
+                  </a:ext>
+                </a:extLst>
+              </p:cNvPr>
+              <p:cNvPicPr>
+                <a:picLocks noChangeAspect="1"/>
+              </p:cNvPicPr>
+              <p:nvPr/>
+            </p:nvPicPr>
+            <p:blipFill>
+              <a:blip r:embed="rId6">
+                <a:extLst>
+                  <a:ext uri="{28A0092B-C50C-407E-A947-70E740481C1C}">
+                    <a14:useLocalDpi xmlns:a14="http://schemas.microsoft.com/office/drawing/2010/main" val="0"/>
+                  </a:ext>
+                </a:extLst>
+              </a:blip>
+              <a:stretch>
+                <a:fillRect/>
+              </a:stretch>
+            </p:blipFill>
+            <p:spPr>
+              <a:xfrm>
+                <a:off x="6892267" y="1524877"/>
+                <a:ext cx="1808122" cy="1808120"/>
+              </a:xfrm>
+              <a:prstGeom prst="rect">
+                <a:avLst/>
+              </a:prstGeom>
+            </p:spPr>
+          </p:pic>
+          <p:pic>
+            <p:nvPicPr>
+              <p:cNvPr id="1026" name="Picture 2" descr="GitHub Logos and Usage · GitHub">
+                <a:extLst>
+                  <a:ext uri="{FF2B5EF4-FFF2-40B4-BE49-F238E27FC236}">
+                    <a16:creationId xmlns:a16="http://schemas.microsoft.com/office/drawing/2014/main" id="{8A5A20EE-77E5-8292-A45C-0E1AFE3BB70A}"/>
+                  </a:ext>
+                </a:extLst>
+              </p:cNvPr>
+              <p:cNvPicPr>
+                <a:picLocks noChangeAspect="1" noChangeArrowheads="1"/>
+              </p:cNvPicPr>
+              <p:nvPr/>
+            </p:nvPicPr>
+            <p:blipFill rotWithShape="1">
+              <a:blip r:embed="rId7">
+                <a:extLst>
+                  <a:ext uri="{28A0092B-C50C-407E-A947-70E740481C1C}">
+                    <a14:useLocalDpi xmlns:a14="http://schemas.microsoft.com/office/drawing/2010/main" val="0"/>
+                  </a:ext>
+                </a:extLst>
+              </a:blip>
+              <a:srcRect l="12807" t="7066" r="12981" b="4981"/>
+              <a:stretch/>
+            </p:blipFill>
+            <p:spPr bwMode="auto">
+              <a:xfrm>
+                <a:off x="8259929" y="2874522"/>
+                <a:ext cx="575980" cy="577316"/>
+              </a:xfrm>
+              <a:prstGeom prst="flowChartConnector">
+                <a:avLst/>
+              </a:prstGeom>
+              <a:noFill/>
+              <a:ln w="19050">
+                <a:solidFill>
+                  <a:schemeClr val="bg2">
+                    <a:lumMod val="10000"/>
+                  </a:schemeClr>
+                </a:solidFill>
+              </a:ln>
+              <a:effectLst>
+                <a:outerShdw blurRad="50800" dist="38100" dir="2700000" algn="tl" rotWithShape="0">
+                  <a:prstClr val="black">
+                    <a:alpha val="40000"/>
+                  </a:prstClr>
+                </a:outerShdw>
+              </a:effectLst>
+              <a:extLst>
+                <a:ext uri="{909E8E84-426E-40DD-AFC4-6F175D3DCCD1}">
+                  <a14:hiddenFill xmlns:a14="http://schemas.microsoft.com/office/drawing/2010/main">
+                    <a:solidFill>
+                      <a:srgbClr val="FFFFFF"/>
+                    </a:solidFill>
+                  </a14:hiddenFill>
+                </a:ext>
+              </a:extLst>
+            </p:spPr>
+          </p:pic>
+        </p:grpSp>
+        <p:sp>
+          <p:nvSpPr>
+            <p:cNvPr id="35" name="TextBox 34">
+              <a:extLst>
+                <a:ext uri="{FF2B5EF4-FFF2-40B4-BE49-F238E27FC236}">
+                  <a16:creationId xmlns:a16="http://schemas.microsoft.com/office/drawing/2014/main" id="{5BF1239D-8266-931D-DCF9-C52B3C173856}"/>
+                </a:ext>
+              </a:extLst>
+            </p:cNvPr>
+            <p:cNvSpPr txBox="1"/>
+            <p:nvPr/>
+          </p:nvSpPr>
+          <p:spPr>
+            <a:xfrm>
+              <a:off x="4651692" y="1070666"/>
+              <a:ext cx="3594566" cy="304011"/>
+            </a:xfrm>
+            <a:prstGeom prst="rect">
+              <a:avLst/>
+            </a:prstGeom>
+            <a:noFill/>
+          </p:spPr>
+          <p:txBody>
+            <a:bodyPr wrap="square">
+              <a:spAutoFit/>
+            </a:bodyPr>
+            <a:lstStyle/>
+            <a:p>
+              <a:pPr algn="ctr"/>
+              <a:r>
+                <a:rPr lang="en-US" sz="1400" b="1" dirty="0">
+                  <a:latin typeface="Graphik" panose="020B0503030202060203" pitchFamily="34" charset="0"/>
+                </a:rPr>
+                <a:t>github.com/kencopas/Capstone</a:t>
+              </a:r>
+            </a:p>
+          </p:txBody>
+        </p:sp>
+      </p:grpSp>
+    </p:spTree>
+    <p:extLst>
+      <p:ext uri="{BB962C8B-B14F-4D97-AF65-F5344CB8AC3E}">
+        <p14:creationId xmlns:p14="http://schemas.microsoft.com/office/powerpoint/2010/main" val="204358488"/>
       </p:ext>
     </p:extLst>
   </p:cSld>
@@ -38185,26 +38476,4 @@
     </a:ext>
   </a:extLst>
 </a:theme>
-</file>
-
-<file path=ppt/webextensions/webextension1.xml><?xml version="1.0" encoding="utf-8"?>
-<we:webextension xmlns:we="http://schemas.microsoft.com/office/webextensions/webextension/2010/11" id="{F5818021-DA5E-4DA6-B7BD-5C6EB037C104}">
-  <we:reference id="wa200004798" version="1.0.1.0" store="en-US" storeType="OMEX"/>
-  <we:alternateReferences>
-    <we:reference id="wa200004798" version="1.0.1.0" store="wa200004798" storeType="OMEX"/>
-  </we:alternateReferences>
-  <we:properties>
-    <we:property name="embedForm" value="&quot;{\&quot;site\&quot;:\&quot;\&quot;,\&quot;domain\&quot;:\&quot;public.tableau.com\&quot;,\&quot;worksheet\&quot;:\&quot;CustomerDataDashboard\&quot;,\&quot;dashboard\&quot;:\&quot;CustomerDataDashboard_17484417707510\&quot;,\&quot;tabs\&quot;:true,\&quot;toolbar\&quot;:true}&quot;"/>
-    <we:property name="embedUrl" value="&quot;\&quot;https://public.tableau.com/views/CustomerDataDashboard_17484417707510/CustomerDataDashboard\&quot;&quot;"/>
-    <we:property name="filters" value="&quot;[]&quot;"/>
-    <we:property name="isInstalled" value="&quot;true&quot;"/>
-    <we:property name="marks" value="&quot;[]&quot;"/>
-    <we:property name="parameters" value="&quot;[]&quot;"/>
-    <we:property name="serverType" value="&quot;\&quot;public\&quot;&quot;"/>
-    <we:property name="tabs" value="&quot;null&quot;"/>
-    <we:property name="toolbar" value="&quot;null&quot;"/>
-  </we:properties>
-  <we:bindings/>
-  <we:snapshot xmlns:r="http://schemas.openxmlformats.org/officeDocument/2006/relationships" r:embed="rId1"/>
-</we:webextension>
 </file>
</xml_diff>

<commit_message>
Tableau data added; Data Client pipeline updated
</commit_message>
<xml_diff>
--- a/docs/Kenneth Copas - Capstone Presentation.pptx
+++ b/docs/Kenneth Copas - Capstone Presentation.pptx
@@ -157,7 +157,7 @@
 <file path=ppt/revisionInfo.xml><?xml version="1.0" encoding="utf-8"?>
 <p1510:revInfo xmlns:a="http://schemas.openxmlformats.org/drawingml/2006/main" xmlns:r="http://schemas.openxmlformats.org/officeDocument/2006/relationships" xmlns:p1510="http://schemas.microsoft.com/office/powerpoint/2015/10/main">
   <p1510:revLst>
-    <p1510:client id="{774A18C4-AB25-47E3-BB86-8143C4A91D91}" v="2662" dt="2025-06-02T14:11:36.260"/>
+    <p1510:client id="{C033EAB2-3B57-40FC-AFA2-E72F0E9566D5}" v="24" dt="2025-06-03T20:37:17.542"/>
   </p1510:revLst>
 </p1510:revInfo>
 </file>
@@ -659,70 +659,6 @@
           <pc:docMk/>
           <pc:sldMk cId="962527845" sldId="267"/>
         </pc:sldMkLst>
-        <pc:spChg chg="mod">
-          <ac:chgData name="Kenneth Copas" userId="acf87e8c-e0c4-48a9-850b-6aa06780f160" providerId="ADAL" clId="{774A18C4-AB25-47E3-BB86-8143C4A91D91}" dt="2025-05-30T13:19:51.217" v="5596" actId="20577"/>
-          <ac:spMkLst>
-            <pc:docMk/>
-            <pc:sldMk cId="962527845" sldId="267"/>
-            <ac:spMk id="2" creationId="{466DB94C-97D3-0B5E-1933-8206C00C7A1E}"/>
-          </ac:spMkLst>
-        </pc:spChg>
-        <pc:spChg chg="add del">
-          <ac:chgData name="Kenneth Copas" userId="acf87e8c-e0c4-48a9-850b-6aa06780f160" providerId="ADAL" clId="{774A18C4-AB25-47E3-BB86-8143C4A91D91}" dt="2025-05-30T13:04:54.628" v="5232"/>
-          <ac:spMkLst>
-            <pc:docMk/>
-            <pc:sldMk cId="962527845" sldId="267"/>
-            <ac:spMk id="27" creationId="{8C790BE2-4E4F-4AAF-81A2-4A6F4885EBE6}"/>
-          </ac:spMkLst>
-        </pc:spChg>
-        <pc:spChg chg="add del">
-          <ac:chgData name="Kenneth Copas" userId="acf87e8c-e0c4-48a9-850b-6aa06780f160" providerId="ADAL" clId="{774A18C4-AB25-47E3-BB86-8143C4A91D91}" dt="2025-05-30T13:04:54.628" v="5232"/>
-          <ac:spMkLst>
-            <pc:docMk/>
-            <pc:sldMk cId="962527845" sldId="267"/>
-            <ac:spMk id="29" creationId="{D28B54C3-B57B-472A-B96E-1FCB67093DC2}"/>
-          </ac:spMkLst>
-        </pc:spChg>
-        <pc:spChg chg="add del">
-          <ac:chgData name="Kenneth Copas" userId="acf87e8c-e0c4-48a9-850b-6aa06780f160" providerId="ADAL" clId="{774A18C4-AB25-47E3-BB86-8143C4A91D91}" dt="2025-05-30T13:04:54.628" v="5232"/>
-          <ac:spMkLst>
-            <pc:docMk/>
-            <pc:sldMk cId="962527845" sldId="267"/>
-            <ac:spMk id="31" creationId="{7DB3C429-F8DA-49B9-AF84-21996FCF78B5}"/>
-          </ac:spMkLst>
-        </pc:spChg>
-        <pc:spChg chg="add del">
-          <ac:chgData name="Kenneth Copas" userId="acf87e8c-e0c4-48a9-850b-6aa06780f160" providerId="ADAL" clId="{774A18C4-AB25-47E3-BB86-8143C4A91D91}" dt="2025-05-30T13:04:54.628" v="5232"/>
-          <ac:spMkLst>
-            <pc:docMk/>
-            <pc:sldMk cId="962527845" sldId="267"/>
-            <ac:spMk id="33" creationId="{E12088DD-B1AD-40E0-8B86-1D87A2CCD9BE}"/>
-          </ac:spMkLst>
-        </pc:spChg>
-        <pc:spChg chg="add del">
-          <ac:chgData name="Kenneth Copas" userId="acf87e8c-e0c4-48a9-850b-6aa06780f160" providerId="ADAL" clId="{774A18C4-AB25-47E3-BB86-8143C4A91D91}" dt="2025-05-30T13:04:54.628" v="5232"/>
-          <ac:spMkLst>
-            <pc:docMk/>
-            <pc:sldMk cId="962527845" sldId="267"/>
-            <ac:spMk id="35" creationId="{C4C9F2B0-1044-46EB-8AEB-C3BFFDE6C2CC}"/>
-          </ac:spMkLst>
-        </pc:spChg>
-        <pc:spChg chg="add del">
-          <ac:chgData name="Kenneth Copas" userId="acf87e8c-e0c4-48a9-850b-6aa06780f160" providerId="ADAL" clId="{774A18C4-AB25-47E3-BB86-8143C4A91D91}" dt="2025-05-30T13:04:54.628" v="5232"/>
-          <ac:spMkLst>
-            <pc:docMk/>
-            <pc:sldMk cId="962527845" sldId="267"/>
-            <ac:spMk id="37" creationId="{0C395952-4E26-45A2-8756-2ADFD6E53C6E}"/>
-          </ac:spMkLst>
-        </pc:spChg>
-        <pc:spChg chg="add del">
-          <ac:chgData name="Kenneth Copas" userId="acf87e8c-e0c4-48a9-850b-6aa06780f160" providerId="ADAL" clId="{774A18C4-AB25-47E3-BB86-8143C4A91D91}" dt="2025-05-30T13:04:54.628" v="5232"/>
-          <ac:spMkLst>
-            <pc:docMk/>
-            <pc:sldMk cId="962527845" sldId="267"/>
-            <ac:spMk id="39" creationId="{4734BADF-9461-4621-B112-2D7BABEA7DD0}"/>
-          </ac:spMkLst>
-        </pc:spChg>
       </pc:sldChg>
       <pc:sldChg chg="addSp delSp modSp del mod">
         <pc:chgData name="Kenneth Copas" userId="acf87e8c-e0c4-48a9-850b-6aa06780f160" providerId="ADAL" clId="{774A18C4-AB25-47E3-BB86-8143C4A91D91}" dt="2025-05-27T19:24:19.487" v="1879" actId="47"/>
@@ -1159,54 +1095,6 @@
           <pc:docMk/>
           <pc:sldMk cId="1850807906" sldId="282"/>
         </pc:sldMkLst>
-        <pc:spChg chg="mod">
-          <ac:chgData name="Kenneth Copas" userId="acf87e8c-e0c4-48a9-850b-6aa06780f160" providerId="ADAL" clId="{774A18C4-AB25-47E3-BB86-8143C4A91D91}" dt="2025-05-28T18:19:45.391" v="4991" actId="20577"/>
-          <ac:spMkLst>
-            <pc:docMk/>
-            <pc:sldMk cId="1850807906" sldId="282"/>
-            <ac:spMk id="2" creationId="{CA73079B-625C-7E78-6901-4FDDE4AEFF10}"/>
-          </ac:spMkLst>
-        </pc:spChg>
-        <pc:spChg chg="add del">
-          <ac:chgData name="Kenneth Copas" userId="acf87e8c-e0c4-48a9-850b-6aa06780f160" providerId="ADAL" clId="{774A18C4-AB25-47E3-BB86-8143C4A91D91}" dt="2025-05-30T13:04:54.628" v="5232"/>
-          <ac:spMkLst>
-            <pc:docMk/>
-            <pc:sldMk cId="1850807906" sldId="282"/>
-            <ac:spMk id="62" creationId="{FB028B4B-EF20-F3AD-462F-7E97A7A0678E}"/>
-          </ac:spMkLst>
-        </pc:spChg>
-        <pc:spChg chg="add del">
-          <ac:chgData name="Kenneth Copas" userId="acf87e8c-e0c4-48a9-850b-6aa06780f160" providerId="ADAL" clId="{774A18C4-AB25-47E3-BB86-8143C4A91D91}" dt="2025-05-30T13:04:54.628" v="5232"/>
-          <ac:spMkLst>
-            <pc:docMk/>
-            <pc:sldMk cId="1850807906" sldId="282"/>
-            <ac:spMk id="63" creationId="{027C87D5-C9EE-AFA4-FACA-179A899DDB0D}"/>
-          </ac:spMkLst>
-        </pc:spChg>
-        <pc:spChg chg="add del">
-          <ac:chgData name="Kenneth Copas" userId="acf87e8c-e0c4-48a9-850b-6aa06780f160" providerId="ADAL" clId="{774A18C4-AB25-47E3-BB86-8143C4A91D91}" dt="2025-05-30T13:04:54.628" v="5232"/>
-          <ac:spMkLst>
-            <pc:docMk/>
-            <pc:sldMk cId="1850807906" sldId="282"/>
-            <ac:spMk id="64" creationId="{5616B5AF-DA75-6380-7636-07E61A5AC012}"/>
-          </ac:spMkLst>
-        </pc:spChg>
-        <pc:spChg chg="add del">
-          <ac:chgData name="Kenneth Copas" userId="acf87e8c-e0c4-48a9-850b-6aa06780f160" providerId="ADAL" clId="{774A18C4-AB25-47E3-BB86-8143C4A91D91}" dt="2025-05-30T13:04:54.628" v="5232"/>
-          <ac:spMkLst>
-            <pc:docMk/>
-            <pc:sldMk cId="1850807906" sldId="282"/>
-            <ac:spMk id="65" creationId="{417E9366-B0B3-8614-FD95-DC0BA7B73B59}"/>
-          </ac:spMkLst>
-        </pc:spChg>
-        <pc:graphicFrameChg chg="add del mod">
-          <ac:chgData name="Kenneth Copas" userId="acf87e8c-e0c4-48a9-850b-6aa06780f160" providerId="ADAL" clId="{774A18C4-AB25-47E3-BB86-8143C4A91D91}" dt="2025-05-28T18:19:40.606" v="4970" actId="1076"/>
-          <ac:graphicFrameMkLst>
-            <pc:docMk/>
-            <pc:sldMk cId="1850807906" sldId="282"/>
-            <ac:graphicFrameMk id="4" creationId="{A3AE5D51-3C2F-A548-7A93-831C25F34FF1}"/>
-          </ac:graphicFrameMkLst>
-        </pc:graphicFrameChg>
       </pc:sldChg>
       <pc:sldChg chg="addSp delSp modSp add mod ord delDesignElem">
         <pc:chgData name="Kenneth Copas" userId="acf87e8c-e0c4-48a9-850b-6aa06780f160" providerId="ADAL" clId="{774A18C4-AB25-47E3-BB86-8143C4A91D91}" dt="2025-05-30T13:04:54.628" v="5232"/>
@@ -2144,6 +2032,149 @@
           <pc:docMk/>
           <pc:sldMk cId="2403396084" sldId="2147471755"/>
         </pc:sldMkLst>
+      </pc:sldChg>
+    </pc:docChg>
+  </pc:docChgLst>
+  <pc:docChgLst>
+    <pc:chgData name="Kenneth Copas" userId="acf87e8c-e0c4-48a9-850b-6aa06780f160" providerId="ADAL" clId="{C033EAB2-3B57-40FC-AFA2-E72F0E9566D5}"/>
+    <pc:docChg chg="undo custSel modSld">
+      <pc:chgData name="Kenneth Copas" userId="acf87e8c-e0c4-48a9-850b-6aa06780f160" providerId="ADAL" clId="{C033EAB2-3B57-40FC-AFA2-E72F0E9566D5}" dt="2025-06-03T20:38:42.769" v="164"/>
+      <pc:docMkLst>
+        <pc:docMk/>
+      </pc:docMkLst>
+      <pc:sldChg chg="modNotesTx">
+        <pc:chgData name="Kenneth Copas" userId="acf87e8c-e0c4-48a9-850b-6aa06780f160" providerId="ADAL" clId="{C033EAB2-3B57-40FC-AFA2-E72F0E9566D5}" dt="2025-06-03T20:38:42.769" v="164"/>
+        <pc:sldMkLst>
+          <pc:docMk/>
+          <pc:sldMk cId="1102396629" sldId="283"/>
+        </pc:sldMkLst>
+      </pc:sldChg>
+      <pc:sldChg chg="addSp delSp modSp mod">
+        <pc:chgData name="Kenneth Copas" userId="acf87e8c-e0c4-48a9-850b-6aa06780f160" providerId="ADAL" clId="{C033EAB2-3B57-40FC-AFA2-E72F0E9566D5}" dt="2025-06-03T20:37:51.725" v="138" actId="114"/>
+        <pc:sldMkLst>
+          <pc:docMk/>
+          <pc:sldMk cId="204358488" sldId="293"/>
+        </pc:sldMkLst>
+        <pc:spChg chg="mod">
+          <ac:chgData name="Kenneth Copas" userId="acf87e8c-e0c4-48a9-850b-6aa06780f160" providerId="ADAL" clId="{C033EAB2-3B57-40FC-AFA2-E72F0E9566D5}" dt="2025-06-03T20:36:38.520" v="133" actId="14861"/>
+          <ac:spMkLst>
+            <pc:docMk/>
+            <pc:sldMk cId="204358488" sldId="293"/>
+            <ac:spMk id="2" creationId="{635360F9-5A89-B78D-74B2-CD2ABE5702B8}"/>
+          </ac:spMkLst>
+        </pc:spChg>
+        <pc:spChg chg="mod">
+          <ac:chgData name="Kenneth Copas" userId="acf87e8c-e0c4-48a9-850b-6aa06780f160" providerId="ADAL" clId="{C033EAB2-3B57-40FC-AFA2-E72F0E9566D5}" dt="2025-06-03T20:37:51.725" v="138" actId="114"/>
+          <ac:spMkLst>
+            <pc:docMk/>
+            <pc:sldMk cId="204358488" sldId="293"/>
+            <ac:spMk id="6" creationId="{16A5E477-5AC0-E330-5900-07ED49CA3D06}"/>
+          </ac:spMkLst>
+        </pc:spChg>
+        <pc:spChg chg="add del mod">
+          <ac:chgData name="Kenneth Copas" userId="acf87e8c-e0c4-48a9-850b-6aa06780f160" providerId="ADAL" clId="{C033EAB2-3B57-40FC-AFA2-E72F0E9566D5}" dt="2025-06-03T20:35:50.456" v="124" actId="478"/>
+          <ac:spMkLst>
+            <pc:docMk/>
+            <pc:sldMk cId="204358488" sldId="293"/>
+            <ac:spMk id="9" creationId="{B5932152-24CF-28E0-DA88-8764B4502E62}"/>
+          </ac:spMkLst>
+        </pc:spChg>
+        <pc:spChg chg="mod">
+          <ac:chgData name="Kenneth Copas" userId="acf87e8c-e0c4-48a9-850b-6aa06780f160" providerId="ADAL" clId="{C033EAB2-3B57-40FC-AFA2-E72F0E9566D5}" dt="2025-06-03T20:36:04" v="130" actId="1036"/>
+          <ac:spMkLst>
+            <pc:docMk/>
+            <pc:sldMk cId="204358488" sldId="293"/>
+            <ac:spMk id="33" creationId="{4C7EE61A-0E1F-F823-F612-AF78A3250F4F}"/>
+          </ac:spMkLst>
+        </pc:spChg>
+        <pc:spChg chg="mod">
+          <ac:chgData name="Kenneth Copas" userId="acf87e8c-e0c4-48a9-850b-6aa06780f160" providerId="ADAL" clId="{C033EAB2-3B57-40FC-AFA2-E72F0E9566D5}" dt="2025-06-03T20:36:04" v="130" actId="1036"/>
+          <ac:spMkLst>
+            <pc:docMk/>
+            <pc:sldMk cId="204358488" sldId="293"/>
+            <ac:spMk id="35" creationId="{5BF1239D-8266-931D-DCF9-C52B3C173856}"/>
+          </ac:spMkLst>
+        </pc:spChg>
+        <pc:grpChg chg="add del mod">
+          <ac:chgData name="Kenneth Copas" userId="acf87e8c-e0c4-48a9-850b-6aa06780f160" providerId="ADAL" clId="{C033EAB2-3B57-40FC-AFA2-E72F0E9566D5}" dt="2025-06-03T20:36:04" v="130" actId="1036"/>
+          <ac:grpSpMkLst>
+            <pc:docMk/>
+            <pc:sldMk cId="204358488" sldId="293"/>
+            <ac:grpSpMk id="30" creationId="{CB07CE06-4683-17F0-BC6A-4EE71794A763}"/>
+          </ac:grpSpMkLst>
+        </pc:grpChg>
+        <pc:grpChg chg="mod">
+          <ac:chgData name="Kenneth Copas" userId="acf87e8c-e0c4-48a9-850b-6aa06780f160" providerId="ADAL" clId="{C033EAB2-3B57-40FC-AFA2-E72F0E9566D5}" dt="2025-06-03T20:36:04" v="130" actId="1036"/>
+          <ac:grpSpMkLst>
+            <pc:docMk/>
+            <pc:sldMk cId="204358488" sldId="293"/>
+            <ac:grpSpMk id="31" creationId="{99DC67EB-EEE2-2510-7FFB-E91212BBAD08}"/>
+          </ac:grpSpMkLst>
+        </pc:grpChg>
+        <pc:grpChg chg="mod">
+          <ac:chgData name="Kenneth Copas" userId="acf87e8c-e0c4-48a9-850b-6aa06780f160" providerId="ADAL" clId="{C033EAB2-3B57-40FC-AFA2-E72F0E9566D5}" dt="2025-06-03T20:36:04" v="130" actId="1036"/>
+          <ac:grpSpMkLst>
+            <pc:docMk/>
+            <pc:sldMk cId="204358488" sldId="293"/>
+            <ac:grpSpMk id="36" creationId="{D732341D-6569-1B97-53D1-9A6A19F5E1B3}"/>
+          </ac:grpSpMkLst>
+        </pc:grpChg>
+        <pc:grpChg chg="mod">
+          <ac:chgData name="Kenneth Copas" userId="acf87e8c-e0c4-48a9-850b-6aa06780f160" providerId="ADAL" clId="{C033EAB2-3B57-40FC-AFA2-E72F0E9566D5}" dt="2025-06-03T20:36:04" v="130" actId="1036"/>
+          <ac:grpSpMkLst>
+            <pc:docMk/>
+            <pc:sldMk cId="204358488" sldId="293"/>
+            <ac:grpSpMk id="37" creationId="{4FA913BA-EF93-1DB3-96B2-D5D033300339}"/>
+          </ac:grpSpMkLst>
+        </pc:grpChg>
+        <pc:picChg chg="add del mod">
+          <ac:chgData name="Kenneth Copas" userId="acf87e8c-e0c4-48a9-850b-6aa06780f160" providerId="ADAL" clId="{C033EAB2-3B57-40FC-AFA2-E72F0E9566D5}" dt="2025-06-03T20:36:04" v="130" actId="1036"/>
+          <ac:picMkLst>
+            <pc:docMk/>
+            <pc:sldMk cId="204358488" sldId="293"/>
+            <ac:picMk id="13" creationId="{63BD264B-F1EE-CD88-392C-04D4A5886CCA}"/>
+          </ac:picMkLst>
+        </pc:picChg>
+        <pc:picChg chg="mod">
+          <ac:chgData name="Kenneth Copas" userId="acf87e8c-e0c4-48a9-850b-6aa06780f160" providerId="ADAL" clId="{C033EAB2-3B57-40FC-AFA2-E72F0E9566D5}" dt="2025-06-03T20:36:04" v="130" actId="1036"/>
+          <ac:picMkLst>
+            <pc:docMk/>
+            <pc:sldMk cId="204358488" sldId="293"/>
+            <ac:picMk id="26" creationId="{E49FD8E9-A379-EC58-54A4-283C20313E13}"/>
+          </ac:picMkLst>
+        </pc:picChg>
+        <pc:picChg chg="mod">
+          <ac:chgData name="Kenneth Copas" userId="acf87e8c-e0c4-48a9-850b-6aa06780f160" providerId="ADAL" clId="{C033EAB2-3B57-40FC-AFA2-E72F0E9566D5}" dt="2025-06-03T20:36:04" v="130" actId="1036"/>
+          <ac:picMkLst>
+            <pc:docMk/>
+            <pc:sldMk cId="204358488" sldId="293"/>
+            <ac:picMk id="1026" creationId="{8A5A20EE-77E5-8292-A45C-0E1AFE3BB70A}"/>
+          </ac:picMkLst>
+        </pc:picChg>
+        <pc:picChg chg="mod">
+          <ac:chgData name="Kenneth Copas" userId="acf87e8c-e0c4-48a9-850b-6aa06780f160" providerId="ADAL" clId="{C033EAB2-3B57-40FC-AFA2-E72F0E9566D5}" dt="2025-06-03T20:36:04" v="130" actId="1036"/>
+          <ac:picMkLst>
+            <pc:docMk/>
+            <pc:sldMk cId="204358488" sldId="293"/>
+            <ac:picMk id="1064" creationId="{18D658CC-733E-A833-7A8B-C47C04D67BE3}"/>
+          </ac:picMkLst>
+        </pc:picChg>
+        <pc:cxnChg chg="add del mod">
+          <ac:chgData name="Kenneth Copas" userId="acf87e8c-e0c4-48a9-850b-6aa06780f160" providerId="ADAL" clId="{C033EAB2-3B57-40FC-AFA2-E72F0E9566D5}" dt="2025-06-03T20:15:54.837" v="31" actId="478"/>
+          <ac:cxnSpMkLst>
+            <pc:docMk/>
+            <pc:sldMk cId="204358488" sldId="293"/>
+            <ac:cxnSpMk id="5" creationId="{0A0FECB1-5D4B-F75C-8E8A-6924A1226F2F}"/>
+          </ac:cxnSpMkLst>
+        </pc:cxnChg>
+        <pc:cxnChg chg="add del mod">
+          <ac:chgData name="Kenneth Copas" userId="acf87e8c-e0c4-48a9-850b-6aa06780f160" providerId="ADAL" clId="{C033EAB2-3B57-40FC-AFA2-E72F0E9566D5}" dt="2025-06-03T20:15:55.418" v="32" actId="478"/>
+          <ac:cxnSpMkLst>
+            <pc:docMk/>
+            <pc:sldMk cId="204358488" sldId="293"/>
+            <ac:cxnSpMk id="7" creationId="{7364B0CA-2679-3DA2-962E-C742382C0A08}"/>
+          </ac:cxnSpMkLst>
+        </pc:cxnChg>
       </pc:sldChg>
     </pc:docChg>
   </pc:docChgLst>
@@ -16199,6 +16230,93 @@
 </file>
 
 <file path=ppt/notesSlides/notesSlide6.xml><?xml version="1.0" encoding="utf-8"?>
+<p:notes xmlns:a="http://schemas.openxmlformats.org/drawingml/2006/main" xmlns:r="http://schemas.openxmlformats.org/officeDocument/2006/relationships" xmlns:p="http://schemas.openxmlformats.org/presentationml/2006/main">
+  <p:cSld>
+    <p:spTree>
+      <p:nvGrpSpPr>
+        <p:cNvPr id="1" name=""/>
+        <p:cNvGrpSpPr/>
+        <p:nvPr/>
+      </p:nvGrpSpPr>
+      <p:grpSpPr>
+        <a:xfrm>
+          <a:off x="0" y="0"/>
+          <a:ext cx="0" cy="0"/>
+          <a:chOff x="0" y="0"/>
+          <a:chExt cx="0" cy="0"/>
+        </a:xfrm>
+      </p:grpSpPr>
+      <p:sp>
+        <p:nvSpPr>
+          <p:cNvPr id="2" name="Slide Image Placeholder 1"/>
+          <p:cNvSpPr>
+            <a:spLocks noGrp="1" noRot="1" noChangeAspect="1"/>
+          </p:cNvSpPr>
+          <p:nvPr>
+            <p:ph type="sldImg"/>
+          </p:nvPr>
+        </p:nvSpPr>
+        <p:spPr/>
+      </p:sp>
+      <p:sp>
+        <p:nvSpPr>
+          <p:cNvPr id="3" name="Notes Placeholder 2"/>
+          <p:cNvSpPr>
+            <a:spLocks noGrp="1"/>
+          </p:cNvSpPr>
+          <p:nvPr>
+            <p:ph type="body" idx="1"/>
+          </p:nvPr>
+        </p:nvSpPr>
+        <p:spPr/>
+        <p:txBody>
+          <a:bodyPr/>
+          <a:lstStyle/>
+          <a:p>
+            <a:r>
+              <a:rPr lang="en-US" dirty="0"/>
+              <a:t>Tableau Public Viz Link: https://public.tableau.com/views/CustomerDataDashboard_17484417707510/CustomerDataDashboard?:language=en-US&amp;:sid=&amp;:redirect=auth&amp;:display_count=n&amp;:origin=viz_share_link</a:t>
+            </a:r>
+          </a:p>
+        </p:txBody>
+      </p:sp>
+      <p:sp>
+        <p:nvSpPr>
+          <p:cNvPr id="4" name="Slide Number Placeholder 3"/>
+          <p:cNvSpPr>
+            <a:spLocks noGrp="1"/>
+          </p:cNvSpPr>
+          <p:nvPr>
+            <p:ph type="sldNum" sz="quarter" idx="5"/>
+          </p:nvPr>
+        </p:nvSpPr>
+        <p:spPr/>
+        <p:txBody>
+          <a:bodyPr/>
+          <a:lstStyle/>
+          <a:p>
+            <a:fld id="{4B18A450-44F2-44CF-978D-128E91F9EBE0}" type="slidenum">
+              <a:rPr lang="en-US" smtClean="0"/>
+              <a:t>15</a:t>
+            </a:fld>
+            <a:endParaRPr lang="en-US"/>
+          </a:p>
+        </p:txBody>
+      </p:sp>
+    </p:spTree>
+    <p:extLst>
+      <p:ext uri="{BB962C8B-B14F-4D97-AF65-F5344CB8AC3E}">
+        <p14:creationId xmlns:p14="http://schemas.microsoft.com/office/powerpoint/2010/main" val="1552691088"/>
+      </p:ext>
+    </p:extLst>
+  </p:cSld>
+  <p:clrMapOvr>
+    <a:masterClrMapping/>
+  </p:clrMapOvr>
+</p:notes>
+</file>
+
+<file path=ppt/notesSlides/notesSlide7.xml><?xml version="1.0" encoding="utf-8"?>
 <p:notes xmlns:a="http://schemas.openxmlformats.org/drawingml/2006/main" xmlns:r="http://schemas.openxmlformats.org/officeDocument/2006/relationships" xmlns:p="http://schemas.openxmlformats.org/presentationml/2006/main">
   <p:cSld>
     <p:spTree>
@@ -28565,7 +28683,7 @@
           <p:nvPr/>
         </p:nvPicPr>
         <p:blipFill>
-          <a:blip r:embed="rId2">
+          <a:blip r:embed="rId3">
             <a:extLst>
               <a:ext uri="{28A0092B-C50C-407E-A947-70E740481C1C}">
                 <a14:useLocalDpi xmlns:a14="http://schemas.microsoft.com/office/drawing/2010/main" val="0"/>
@@ -29267,18 +29385,44 @@
         <p:spPr>
           <a:xfrm flipH="1">
             <a:off x="500180" y="3440738"/>
-            <a:ext cx="3037453" cy="1815882"/>
+            <a:ext cx="3037453" cy="2431435"/>
           </a:xfrm>
           <a:prstGeom prst="rect">
             <a:avLst/>
           </a:prstGeom>
           <a:noFill/>
+          <a:ln>
+            <a:noFill/>
+          </a:ln>
+          <a:effectLst/>
+          <a:scene3d>
+            <a:camera prst="orthographicFront">
+              <a:rot lat="0" lon="0" rev="0"/>
+            </a:camera>
+            <a:lightRig rig="chilly" dir="t">
+              <a:rot lat="0" lon="0" rev="18480000"/>
+            </a:lightRig>
+          </a:scene3d>
+          <a:sp3d prstMaterial="clear">
+            <a:bevelT h="63500"/>
+          </a:sp3d>
         </p:spPr>
         <p:txBody>
           <a:bodyPr wrap="square" lIns="91440" tIns="45720" rIns="91440" bIns="45720" rtlCol="0" anchor="t">
             <a:spAutoFit/>
           </a:bodyPr>
           <a:lstStyle/>
+          <a:p>
+            <a:pPr algn="ctr">
+              <a:defRPr/>
+            </a:pPr>
+            <a:endParaRPr lang="en-US" sz="2400" b="1" dirty="0">
+              <a:solidFill>
+                <a:srgbClr val="FFFFFF"/>
+              </a:solidFill>
+              <a:latin typeface="Graphik"/>
+            </a:endParaRPr>
+          </a:p>
           <a:p>
             <a:pPr algn="ctr">
               <a:defRPr/>
@@ -29392,7 +29536,7 @@
               <a:defRPr/>
             </a:pPr>
             <a:r>
-              <a:rPr kumimoji="0" lang="en-US" sz="1600" b="0" i="0" u="none" strike="noStrike" kern="1200" cap="none" spc="0" normalizeH="0" baseline="0" noProof="0" dirty="0">
+              <a:rPr kumimoji="0" lang="en-US" sz="1600" b="0" u="none" strike="noStrike" kern="1200" cap="none" spc="0" normalizeH="0" baseline="0" noProof="0" dirty="0">
                 <a:ln>
                   <a:noFill/>
                 </a:ln>
@@ -29436,6 +29580,25 @@
               </a:rPr>
               <a:t>Tampa, FL</a:t>
             </a:r>
+          </a:p>
+          <a:p>
+            <a:pPr marL="0" marR="0" lvl="0" indent="0" algn="ctr" defTabSz="914400" rtl="0" eaLnBrk="1" fontAlgn="auto" latinLnBrk="0" hangingPunct="1">
+              <a:lnSpc>
+                <a:spcPct val="100000"/>
+              </a:lnSpc>
+              <a:spcBef>
+                <a:spcPts val="0"/>
+              </a:spcBef>
+              <a:spcAft>
+                <a:spcPts val="0"/>
+              </a:spcAft>
+              <a:buClrTx/>
+              <a:buSzTx/>
+              <a:buFontTx/>
+              <a:buNone/>
+              <a:tabLst/>
+              <a:defRPr/>
+            </a:pPr>
             <a:endParaRPr kumimoji="0" lang="en-US" sz="1600" b="0" i="0" u="none" strike="noStrike" kern="1200" cap="none" spc="0" normalizeH="0" baseline="0" noProof="0" dirty="0">
               <a:ln>
                 <a:noFill/>
@@ -29506,9 +29669,30 @@
         </p:nvSpPr>
         <p:spPr>
           <a:xfrm>
-            <a:off x="5329378" y="318949"/>
+            <a:off x="5370161" y="131919"/>
             <a:ext cx="5568013" cy="682611"/>
           </a:xfrm>
+          <a:ln>
+            <a:noFill/>
+          </a:ln>
+          <a:effectLst>
+            <a:outerShdw blurRad="50800" dist="38100" dir="2700000" algn="tl" rotWithShape="0">
+              <a:prstClr val="black">
+                <a:alpha val="40000"/>
+              </a:prstClr>
+            </a:outerShdw>
+          </a:effectLst>
+          <a:scene3d>
+            <a:camera prst="orthographicFront">
+              <a:rot lat="0" lon="0" rev="0"/>
+            </a:camera>
+            <a:lightRig rig="glow" dir="t">
+              <a:rot lat="0" lon="0" rev="4800000"/>
+            </a:lightRig>
+          </a:scene3d>
+          <a:sp3d prstMaterial="matte">
+            <a:bevelT w="127000" h="63500"/>
+          </a:sp3d>
         </p:spPr>
         <p:txBody>
           <a:bodyPr>
@@ -29548,10 +29732,10 @@
         </p:nvGrpSpPr>
         <p:grpSpPr>
           <a:xfrm>
-            <a:off x="8235760" y="3949691"/>
-            <a:ext cx="3456060" cy="2685976"/>
-            <a:chOff x="4560834" y="3875264"/>
-            <a:chExt cx="3776282" cy="2934846"/>
+            <a:off x="8188993" y="3866199"/>
+            <a:ext cx="3456060" cy="2813099"/>
+            <a:chOff x="4560831" y="3751780"/>
+            <a:chExt cx="3776282" cy="3073748"/>
           </a:xfrm>
         </p:grpSpPr>
         <p:grpSp>
@@ -29568,10 +29752,10 @@
           </p:nvGrpSpPr>
           <p:grpSpPr>
             <a:xfrm>
-              <a:off x="5249678" y="4264872"/>
-              <a:ext cx="2584618" cy="2545238"/>
-              <a:chOff x="9107884" y="1598613"/>
-              <a:chExt cx="1869000" cy="1840525"/>
+              <a:off x="5281496" y="4271973"/>
+              <a:ext cx="2578730" cy="2553555"/>
+              <a:chOff x="9130892" y="1603748"/>
+              <a:chExt cx="1864742" cy="1846540"/>
             </a:xfrm>
           </p:grpSpPr>
           <p:pic>
@@ -29602,12 +29786,35 @@
             </p:blipFill>
             <p:spPr>
               <a:xfrm>
-                <a:off x="9107884" y="1598613"/>
-                <a:ext cx="1666875" cy="1659857"/>
+                <a:off x="9130892" y="1603748"/>
+                <a:ext cx="1688460" cy="1681346"/>
               </a:xfrm>
               <a:prstGeom prst="rect">
                 <a:avLst/>
               </a:prstGeom>
+              <a:ln w="76200">
+                <a:solidFill>
+                  <a:schemeClr val="bg1"/>
+                </a:solidFill>
+              </a:ln>
+              <a:effectLst>
+                <a:outerShdw blurRad="190500" dist="228600" dir="2700000" algn="ctr">
+                  <a:srgbClr val="000000">
+                    <a:alpha val="30000"/>
+                  </a:srgbClr>
+                </a:outerShdw>
+              </a:effectLst>
+              <a:scene3d>
+                <a:camera prst="orthographicFront">
+                  <a:rot lat="0" lon="0" rev="0"/>
+                </a:camera>
+                <a:lightRig rig="glow" dir="t">
+                  <a:rot lat="0" lon="0" rev="4800000"/>
+                </a:lightRig>
+              </a:scene3d>
+              <a:sp3d prstMaterial="matte">
+                <a:bevelT w="127000" h="63500"/>
+              </a:sp3d>
             </p:spPr>
           </p:pic>
           <p:pic>
@@ -29639,7 +29846,7 @@
             </p:blipFill>
             <p:spPr bwMode="auto">
               <a:xfrm>
-                <a:off x="10411872" y="2874126"/>
+                <a:off x="10430622" y="2885276"/>
                 <a:ext cx="565012" cy="565012"/>
               </a:xfrm>
               <a:prstGeom prst="flowChartConnector">
@@ -29686,7 +29893,7 @@
           </p:nvSpPr>
           <p:spPr>
             <a:xfrm>
-              <a:off x="4560834" y="3875264"/>
+              <a:off x="4560831" y="3751780"/>
               <a:ext cx="3776282" cy="307777"/>
             </a:xfrm>
             <a:prstGeom prst="rect">
@@ -29729,10 +29936,10 @@
         </p:nvGrpSpPr>
         <p:grpSpPr>
           <a:xfrm>
-            <a:off x="8356901" y="1066566"/>
-            <a:ext cx="3213778" cy="2605854"/>
-            <a:chOff x="4651692" y="1070666"/>
-            <a:chExt cx="3594566" cy="2914613"/>
+            <a:off x="8310134" y="931400"/>
+            <a:ext cx="3213778" cy="2777597"/>
+            <a:chOff x="4599384" y="878574"/>
+            <a:chExt cx="3594566" cy="3106705"/>
           </a:xfrm>
         </p:grpSpPr>
         <p:grpSp>
@@ -29789,6 +29996,27 @@
               <a:prstGeom prst="rect">
                 <a:avLst/>
               </a:prstGeom>
+              <a:ln>
+                <a:noFill/>
+              </a:ln>
+              <a:effectLst>
+                <a:outerShdw blurRad="190500" dist="228600" dir="2700000" algn="ctr">
+                  <a:srgbClr val="000000">
+                    <a:alpha val="30000"/>
+                  </a:srgbClr>
+                </a:outerShdw>
+              </a:effectLst>
+              <a:scene3d>
+                <a:camera prst="orthographicFront">
+                  <a:rot lat="0" lon="0" rev="0"/>
+                </a:camera>
+                <a:lightRig rig="glow" dir="t">
+                  <a:rot lat="0" lon="0" rev="4800000"/>
+                </a:lightRig>
+              </a:scene3d>
+              <a:sp3d prstMaterial="matte">
+                <a:bevelT w="127000" h="63500"/>
+              </a:sp3d>
             </p:spPr>
           </p:pic>
           <p:pic>
@@ -29865,8 +30093,8 @@
           </p:nvSpPr>
           <p:spPr>
             <a:xfrm>
-              <a:off x="4651692" y="1070666"/>
-              <a:ext cx="3594566" cy="304011"/>
+              <a:off x="4599384" y="878574"/>
+              <a:ext cx="3594566" cy="344244"/>
             </a:xfrm>
             <a:prstGeom prst="rect">
               <a:avLst/>

</xml_diff>